<commit_message>
Updated document to seperate OVDS servers and define location of processes.
Signed-off-by: Sanjeev BA <iamsanjeev@gmail.com>
</commit_message>
<xml_diff>
--- a/docs/VSS_CCS_Setup.pptx
+++ b/docs/VSS_CCS_Setup.pptx
@@ -259,7 +259,7 @@
           <a:p>
             <a:fld id="{582720FB-8494-47E1-91EF-EB95567107BA}" type="datetimeFigureOut">
               <a:rPr lang="en-US" smtClean="0"/>
-              <a:t>10/19/2021</a:t>
+              <a:t>10/26/2021</a:t>
             </a:fld>
             <a:endParaRPr lang="en-US"/>
           </a:p>
@@ -457,7 +457,7 @@
           <a:p>
             <a:fld id="{582720FB-8494-47E1-91EF-EB95567107BA}" type="datetimeFigureOut">
               <a:rPr lang="en-US" smtClean="0"/>
-              <a:t>10/19/2021</a:t>
+              <a:t>10/26/2021</a:t>
             </a:fld>
             <a:endParaRPr lang="en-US"/>
           </a:p>
@@ -665,7 +665,7 @@
           <a:p>
             <a:fld id="{582720FB-8494-47E1-91EF-EB95567107BA}" type="datetimeFigureOut">
               <a:rPr lang="en-US" smtClean="0"/>
-              <a:t>10/19/2021</a:t>
+              <a:t>10/26/2021</a:t>
             </a:fld>
             <a:endParaRPr lang="en-US"/>
           </a:p>
@@ -863,7 +863,7 @@
           <a:p>
             <a:fld id="{582720FB-8494-47E1-91EF-EB95567107BA}" type="datetimeFigureOut">
               <a:rPr lang="en-US" smtClean="0"/>
-              <a:t>10/19/2021</a:t>
+              <a:t>10/26/2021</a:t>
             </a:fld>
             <a:endParaRPr lang="en-US"/>
           </a:p>
@@ -1138,7 +1138,7 @@
           <a:p>
             <a:fld id="{582720FB-8494-47E1-91EF-EB95567107BA}" type="datetimeFigureOut">
               <a:rPr lang="en-US" smtClean="0"/>
-              <a:t>10/19/2021</a:t>
+              <a:t>10/26/2021</a:t>
             </a:fld>
             <a:endParaRPr lang="en-US"/>
           </a:p>
@@ -1403,7 +1403,7 @@
           <a:p>
             <a:fld id="{582720FB-8494-47E1-91EF-EB95567107BA}" type="datetimeFigureOut">
               <a:rPr lang="en-US" smtClean="0"/>
-              <a:t>10/19/2021</a:t>
+              <a:t>10/26/2021</a:t>
             </a:fld>
             <a:endParaRPr lang="en-US"/>
           </a:p>
@@ -1815,7 +1815,7 @@
           <a:p>
             <a:fld id="{582720FB-8494-47E1-91EF-EB95567107BA}" type="datetimeFigureOut">
               <a:rPr lang="en-US" smtClean="0"/>
-              <a:t>10/19/2021</a:t>
+              <a:t>10/26/2021</a:t>
             </a:fld>
             <a:endParaRPr lang="en-US"/>
           </a:p>
@@ -1956,7 +1956,7 @@
           <a:p>
             <a:fld id="{582720FB-8494-47E1-91EF-EB95567107BA}" type="datetimeFigureOut">
               <a:rPr lang="en-US" smtClean="0"/>
-              <a:t>10/19/2021</a:t>
+              <a:t>10/26/2021</a:t>
             </a:fld>
             <a:endParaRPr lang="en-US"/>
           </a:p>
@@ -2069,7 +2069,7 @@
           <a:p>
             <a:fld id="{582720FB-8494-47E1-91EF-EB95567107BA}" type="datetimeFigureOut">
               <a:rPr lang="en-US" smtClean="0"/>
-              <a:t>10/19/2021</a:t>
+              <a:t>10/26/2021</a:t>
             </a:fld>
             <a:endParaRPr lang="en-US"/>
           </a:p>
@@ -2380,7 +2380,7 @@
           <a:p>
             <a:fld id="{582720FB-8494-47E1-91EF-EB95567107BA}" type="datetimeFigureOut">
               <a:rPr lang="en-US" smtClean="0"/>
-              <a:t>10/19/2021</a:t>
+              <a:t>10/26/2021</a:t>
             </a:fld>
             <a:endParaRPr lang="en-US"/>
           </a:p>
@@ -2668,7 +2668,7 @@
           <a:p>
             <a:fld id="{582720FB-8494-47E1-91EF-EB95567107BA}" type="datetimeFigureOut">
               <a:rPr lang="en-US" smtClean="0"/>
-              <a:t>10/19/2021</a:t>
+              <a:t>10/26/2021</a:t>
             </a:fld>
             <a:endParaRPr lang="en-US"/>
           </a:p>
@@ -2909,7 +2909,7 @@
           <a:p>
             <a:fld id="{582720FB-8494-47E1-91EF-EB95567107BA}" type="datetimeFigureOut">
               <a:rPr lang="en-US" smtClean="0"/>
-              <a:t>10/19/2021</a:t>
+              <a:t>10/26/2021</a:t>
             </a:fld>
             <a:endParaRPr lang="en-US"/>
           </a:p>
@@ -3326,12 +3326,214 @@
           <a:chExt cx="0" cy="0"/>
         </a:xfrm>
       </p:grpSpPr>
+      <p:sp>
+        <p:nvSpPr>
+          <p:cNvPr id="199" name="Rectangle: Rounded Corners 198">
+            <a:extLst>
+              <a:ext uri="{FF2B5EF4-FFF2-40B4-BE49-F238E27FC236}">
+                <a16:creationId xmlns:a16="http://schemas.microsoft.com/office/drawing/2014/main" id="{4A70F532-40AA-4CD2-9B38-2A1ABBC9AEBE}"/>
+              </a:ext>
+            </a:extLst>
+          </p:cNvPr>
+          <p:cNvSpPr/>
+          <p:nvPr/>
+        </p:nvSpPr>
+        <p:spPr>
+          <a:xfrm>
+            <a:off x="558413" y="1171724"/>
+            <a:ext cx="3670687" cy="1409552"/>
+          </a:xfrm>
+          <a:prstGeom prst="roundRect">
+            <a:avLst/>
+          </a:prstGeom>
+          <a:solidFill>
+            <a:schemeClr val="accent1">
+              <a:lumMod val="40000"/>
+              <a:lumOff val="60000"/>
+              <a:alpha val="38000"/>
+            </a:schemeClr>
+          </a:solidFill>
+        </p:spPr>
+        <p:style>
+          <a:lnRef idx="2">
+            <a:schemeClr val="accent1">
+              <a:shade val="50000"/>
+            </a:schemeClr>
+          </a:lnRef>
+          <a:fillRef idx="1">
+            <a:schemeClr val="accent1"/>
+          </a:fillRef>
+          <a:effectRef idx="0">
+            <a:schemeClr val="accent1"/>
+          </a:effectRef>
+          <a:fontRef idx="minor">
+            <a:schemeClr val="lt1"/>
+          </a:fontRef>
+        </p:style>
+        <p:txBody>
+          <a:bodyPr rtlCol="0" anchor="t"/>
+          <a:lstStyle/>
+          <a:p>
+            <a:pPr algn="ctr"/>
+            <a:r>
+              <a:rPr lang="en-US" sz="1400" dirty="0" err="1">
+                <a:latin typeface="Calibri" panose="020F0502020204030204" pitchFamily="34" charset="0"/>
+                <a:cs typeface="Calibri" panose="020F0502020204030204" pitchFamily="34" charset="0"/>
+                <a:hlinkClick r:id="rId2"/>
+              </a:rPr>
+              <a:t>git@github.com:COVESA</a:t>
+            </a:r>
+            <a:r>
+              <a:rPr lang="en-US" sz="1400" dirty="0">
+                <a:latin typeface="Calibri" panose="020F0502020204030204" pitchFamily="34" charset="0"/>
+                <a:cs typeface="Calibri" panose="020F0502020204030204" pitchFamily="34" charset="0"/>
+                <a:hlinkClick r:id="rId2"/>
+              </a:rPr>
+              <a:t>/ccs-</a:t>
+            </a:r>
+            <a:r>
+              <a:rPr lang="en-US" sz="1400" dirty="0" err="1">
+                <a:latin typeface="Calibri" panose="020F0502020204030204" pitchFamily="34" charset="0"/>
+                <a:cs typeface="Calibri" panose="020F0502020204030204" pitchFamily="34" charset="0"/>
+                <a:hlinkClick r:id="rId2"/>
+              </a:rPr>
+              <a:t>components.git</a:t>
+            </a:r>
+            <a:endParaRPr lang="en-US" sz="1400" dirty="0">
+              <a:latin typeface="Calibri" panose="020F0502020204030204" pitchFamily="34" charset="0"/>
+              <a:cs typeface="Calibri" panose="020F0502020204030204" pitchFamily="34" charset="0"/>
+            </a:endParaRPr>
+          </a:p>
+          <a:p>
+            <a:pPr algn="ctr"/>
+            <a:r>
+              <a:rPr lang="en-US" sz="1100" b="1" dirty="0">
+                <a:solidFill>
+                  <a:srgbClr val="7030A0"/>
+                </a:solidFill>
+                <a:latin typeface="Calibri" panose="020F0502020204030204" pitchFamily="34" charset="0"/>
+                <a:cs typeface="Calibri" panose="020F0502020204030204" pitchFamily="34" charset="0"/>
+              </a:rPr>
+              <a:t>Cloud to Vehicle via </a:t>
+            </a:r>
+            <a:r>
+              <a:rPr lang="en-US" sz="1100" b="1" dirty="0" err="1">
+                <a:solidFill>
+                  <a:srgbClr val="7030A0"/>
+                </a:solidFill>
+                <a:latin typeface="Calibri" panose="020F0502020204030204" pitchFamily="34" charset="0"/>
+                <a:cs typeface="Calibri" panose="020F0502020204030204" pitchFamily="34" charset="0"/>
+              </a:rPr>
+              <a:t>LiveSim</a:t>
+            </a:r>
+            <a:r>
+              <a:rPr lang="en-US" sz="1100" b="1" dirty="0">
+                <a:solidFill>
+                  <a:srgbClr val="7030A0"/>
+                </a:solidFill>
+                <a:latin typeface="Calibri" panose="020F0502020204030204" pitchFamily="34" charset="0"/>
+                <a:cs typeface="Calibri" panose="020F0502020204030204" pitchFamily="34" charset="0"/>
+              </a:rPr>
+              <a:t>  </a:t>
+            </a:r>
+          </a:p>
+          <a:p>
+            <a:pPr algn="ctr"/>
+            <a:r>
+              <a:rPr lang="en-US" sz="1100" b="1" dirty="0">
+                <a:solidFill>
+                  <a:srgbClr val="7030A0"/>
+                </a:solidFill>
+                <a:latin typeface="Calibri" panose="020F0502020204030204" pitchFamily="34" charset="0"/>
+                <a:cs typeface="Calibri" panose="020F0502020204030204" pitchFamily="34" charset="0"/>
+              </a:rPr>
+              <a:t>(</a:t>
+            </a:r>
+            <a:r>
+              <a:rPr lang="en-US" sz="1100" b="1" i="0" dirty="0">
+                <a:solidFill>
+                  <a:srgbClr val="7030A0"/>
+                </a:solidFill>
+                <a:effectLst/>
+                <a:latin typeface="Calibri" panose="020F0502020204030204" pitchFamily="34" charset="0"/>
+                <a:cs typeface="Calibri" panose="020F0502020204030204" pitchFamily="34" charset="0"/>
+              </a:rPr>
+              <a:t>./</a:t>
+            </a:r>
+            <a:r>
+              <a:rPr lang="en-US" sz="1100" b="1" i="0" dirty="0" err="1">
+                <a:solidFill>
+                  <a:srgbClr val="7030A0"/>
+                </a:solidFill>
+                <a:effectLst/>
+                <a:latin typeface="Calibri" panose="020F0502020204030204" pitchFamily="34" charset="0"/>
+                <a:cs typeface="Calibri" panose="020F0502020204030204" pitchFamily="34" charset="0"/>
+              </a:rPr>
+              <a:t>ovds_server</a:t>
+            </a:r>
+            <a:r>
+              <a:rPr lang="en-US" sz="1100" b="1" i="0" dirty="0">
+                <a:solidFill>
+                  <a:srgbClr val="7030A0"/>
+                </a:solidFill>
+                <a:effectLst/>
+                <a:latin typeface="Calibri" panose="020F0502020204030204" pitchFamily="34" charset="0"/>
+                <a:cs typeface="Calibri" panose="020F0502020204030204" pitchFamily="34" charset="0"/>
+              </a:rPr>
+              <a:t> </a:t>
+            </a:r>
+            <a:r>
+              <a:rPr lang="en-US" sz="1100" b="1" i="0" dirty="0" err="1">
+                <a:solidFill>
+                  <a:srgbClr val="7030A0"/>
+                </a:solidFill>
+                <a:effectLst/>
+                <a:latin typeface="Calibri" panose="020F0502020204030204" pitchFamily="34" charset="0"/>
+                <a:cs typeface="Calibri" panose="020F0502020204030204" pitchFamily="34" charset="0"/>
+              </a:rPr>
+              <a:t>db</a:t>
+            </a:r>
+            <a:r>
+              <a:rPr lang="en-US" sz="1100" b="1" i="0" dirty="0">
+                <a:solidFill>
+                  <a:srgbClr val="7030A0"/>
+                </a:solidFill>
+                <a:effectLst/>
+                <a:latin typeface="Calibri" panose="020F0502020204030204" pitchFamily="34" charset="0"/>
+                <a:cs typeface="Calibri" panose="020F0502020204030204" pitchFamily="34" charset="0"/>
+              </a:rPr>
+              <a:t>-file-name </a:t>
+            </a:r>
+            <a:r>
+              <a:rPr lang="en-US" sz="1100" b="1" i="0" dirty="0" err="1">
+                <a:solidFill>
+                  <a:srgbClr val="7030A0"/>
+                </a:solidFill>
+                <a:effectLst/>
+                <a:latin typeface="Calibri" panose="020F0502020204030204" pitchFamily="34" charset="0"/>
+                <a:cs typeface="Calibri" panose="020F0502020204030204" pitchFamily="34" charset="0"/>
+              </a:rPr>
+              <a:t>livesim</a:t>
+            </a:r>
+            <a:r>
+              <a:rPr lang="en-US" sz="1100" b="1" dirty="0">
+                <a:solidFill>
+                  <a:srgbClr val="7030A0"/>
+                </a:solidFill>
+                <a:latin typeface="Calibri" panose="020F0502020204030204" pitchFamily="34" charset="0"/>
+                <a:cs typeface="Calibri" panose="020F0502020204030204" pitchFamily="34" charset="0"/>
+              </a:rPr>
+              <a:t>)</a:t>
+            </a:r>
+          </a:p>
+        </p:txBody>
+      </p:sp>
       <p:grpSp>
         <p:nvGrpSpPr>
-          <p:cNvPr id="127" name="Group 126">
-            <a:extLst>
-              <a:ext uri="{FF2B5EF4-FFF2-40B4-BE49-F238E27FC236}">
-                <a16:creationId xmlns:a16="http://schemas.microsoft.com/office/drawing/2014/main" id="{BEA2721B-31C8-49FD-B48B-CCDD6281765F}"/>
+          <p:cNvPr id="252" name="Group 251">
+            <a:extLst>
+              <a:ext uri="{FF2B5EF4-FFF2-40B4-BE49-F238E27FC236}">
+                <a16:creationId xmlns:a16="http://schemas.microsoft.com/office/drawing/2014/main" id="{DD457AED-907D-41BD-8E27-0D0842CBD68C}"/>
               </a:ext>
             </a:extLst>
           </p:cNvPr>
@@ -3340,10 +3542,10 @@
         </p:nvGrpSpPr>
         <p:grpSpPr>
           <a:xfrm>
-            <a:off x="258833" y="865063"/>
-            <a:ext cx="5141001" cy="1493883"/>
-            <a:chOff x="258833" y="865063"/>
-            <a:chExt cx="5048386" cy="1493883"/>
+            <a:off x="3289080" y="2876917"/>
+            <a:ext cx="2928204" cy="1289747"/>
+            <a:chOff x="4338040" y="2811603"/>
+            <a:chExt cx="2928204" cy="1289747"/>
           </a:xfrm>
         </p:grpSpPr>
         <p:sp>
@@ -3360,8 +3562,8 @@
           </p:nvSpPr>
           <p:spPr>
             <a:xfrm>
-              <a:off x="264363" y="865063"/>
-              <a:ext cx="5042856" cy="1493883"/>
+              <a:off x="4352632" y="2811603"/>
+              <a:ext cx="2829848" cy="1288485"/>
             </a:xfrm>
             <a:prstGeom prst="roundRect">
               <a:avLst/>
@@ -3393,10 +3595,12 @@
             <a:lstStyle/>
             <a:p>
               <a:pPr algn="ctr"/>
-              <a:endParaRPr lang="en-US" dirty="0">
+              <a:endParaRPr lang="en-US" sz="1600" dirty="0">
                 <a:solidFill>
                   <a:schemeClr val="bg1"/>
                 </a:solidFill>
+                <a:latin typeface="Calibri" panose="020F0502020204030204" pitchFamily="34" charset="0"/>
+                <a:cs typeface="Calibri" panose="020F0502020204030204" pitchFamily="34" charset="0"/>
               </a:endParaRPr>
             </a:p>
           </p:txBody>
@@ -3415,8 +3619,8 @@
           </p:nvSpPr>
           <p:spPr>
             <a:xfrm>
-              <a:off x="258833" y="865842"/>
-              <a:ext cx="4913227" cy="1477328"/>
+              <a:off x="4338040" y="2824077"/>
+              <a:ext cx="2928204" cy="1277273"/>
             </a:xfrm>
             <a:prstGeom prst="rect">
               <a:avLst/>
@@ -3431,87 +3635,128 @@
             <a:p>
               <a:pPr algn="ctr"/>
               <a:r>
-                <a:rPr lang="en-US" dirty="0">
-                  <a:hlinkClick r:id="rId2"/>
+                <a:rPr lang="en-US" sz="1100" dirty="0">
+                  <a:latin typeface="Calibri" panose="020F0502020204030204" pitchFamily="34" charset="0"/>
+                  <a:cs typeface="Calibri" panose="020F0502020204030204" pitchFamily="34" charset="0"/>
+                  <a:hlinkClick r:id="rId3"/>
                 </a:rPr>
                 <a:t>GENIVI/</a:t>
               </a:r>
               <a:r>
-                <a:rPr lang="en-US" dirty="0" err="1">
-                  <a:hlinkClick r:id="rId2"/>
+                <a:rPr lang="en-US" sz="1100" dirty="0" err="1">
+                  <a:latin typeface="Calibri" panose="020F0502020204030204" pitchFamily="34" charset="0"/>
+                  <a:cs typeface="Calibri" panose="020F0502020204030204" pitchFamily="34" charset="0"/>
+                  <a:hlinkClick r:id="rId3"/>
                 </a:rPr>
                 <a:t>vehicle_signal_specification.git</a:t>
               </a:r>
-              <a:endParaRPr lang="en-US" dirty="0"/>
+              <a:endParaRPr lang="en-US" sz="1100" dirty="0">
+                <a:latin typeface="Calibri" panose="020F0502020204030204" pitchFamily="34" charset="0"/>
+                <a:cs typeface="Calibri" panose="020F0502020204030204" pitchFamily="34" charset="0"/>
+              </a:endParaRPr>
             </a:p>
             <a:p>
               <a:pPr algn="ctr"/>
               <a:r>
-                <a:rPr lang="en-US" sz="1200" dirty="0"/>
+                <a:rPr lang="en-US" sz="1100" dirty="0">
+                  <a:latin typeface="Calibri" panose="020F0502020204030204" pitchFamily="34" charset="0"/>
+                  <a:cs typeface="Calibri" panose="020F0502020204030204" pitchFamily="34" charset="0"/>
+                </a:rPr>
                 <a:t>With git clone --recurse-submodules  </a:t>
               </a:r>
             </a:p>
             <a:p>
               <a:pPr algn="ctr"/>
-              <a:endParaRPr lang="en-US" sz="1200" dirty="0"/>
+              <a:endParaRPr lang="en-US" sz="1100" dirty="0">
+                <a:latin typeface="Calibri" panose="020F0502020204030204" pitchFamily="34" charset="0"/>
+                <a:cs typeface="Calibri" panose="020F0502020204030204" pitchFamily="34" charset="0"/>
+              </a:endParaRPr>
             </a:p>
             <a:p>
+              <a:pPr algn="ctr"/>
               <a:r>
-                <a:rPr lang="en-US" sz="1200" dirty="0"/>
-                <a:t>	</a:t>
-              </a:r>
-              <a:r>
-                <a:rPr lang="en-US" sz="1200" dirty="0" err="1"/>
+                <a:rPr lang="en-US" sz="1100" dirty="0" err="1">
+                  <a:latin typeface="Calibri" panose="020F0502020204030204" pitchFamily="34" charset="0"/>
+                  <a:cs typeface="Calibri" panose="020F0502020204030204" pitchFamily="34" charset="0"/>
+                </a:rPr>
                 <a:t>sudo</a:t>
               </a:r>
               <a:r>
-                <a:rPr lang="en-US" sz="1200" dirty="0"/>
+                <a:rPr lang="en-US" sz="1100" dirty="0">
+                  <a:latin typeface="Calibri" panose="020F0502020204030204" pitchFamily="34" charset="0"/>
+                  <a:cs typeface="Calibri" panose="020F0502020204030204" pitchFamily="34" charset="0"/>
+                </a:rPr>
                 <a:t> apt install python3-pip</a:t>
               </a:r>
             </a:p>
             <a:p>
+              <a:pPr algn="ctr"/>
               <a:r>
-                <a:rPr lang="en-US" sz="1200" dirty="0"/>
-                <a:t>	</a:t>
-              </a:r>
-              <a:r>
-                <a:rPr lang="en-US" sz="1200" dirty="0" err="1"/>
+                <a:rPr lang="en-US" sz="1100" dirty="0" err="1">
+                  <a:latin typeface="Calibri" panose="020F0502020204030204" pitchFamily="34" charset="0"/>
+                  <a:cs typeface="Calibri" panose="020F0502020204030204" pitchFamily="34" charset="0"/>
+                </a:rPr>
                 <a:t>sudo</a:t>
               </a:r>
               <a:r>
-                <a:rPr lang="en-US" sz="1200" dirty="0"/>
+                <a:rPr lang="en-US" sz="1100" dirty="0">
+                  <a:latin typeface="Calibri" panose="020F0502020204030204" pitchFamily="34" charset="0"/>
+                  <a:cs typeface="Calibri" panose="020F0502020204030204" pitchFamily="34" charset="0"/>
+                </a:rPr>
                 <a:t> pip install </a:t>
               </a:r>
               <a:r>
-                <a:rPr lang="en-US" sz="1200" dirty="0" err="1"/>
+                <a:rPr lang="en-US" sz="1100" dirty="0" err="1">
+                  <a:latin typeface="Calibri" panose="020F0502020204030204" pitchFamily="34" charset="0"/>
+                  <a:cs typeface="Calibri" panose="020F0502020204030204" pitchFamily="34" charset="0"/>
+                </a:rPr>
                 <a:t>anytree</a:t>
               </a:r>
               <a:r>
-                <a:rPr lang="en-US" sz="1200" dirty="0"/>
+                <a:rPr lang="en-US" sz="1100" dirty="0">
+                  <a:latin typeface="Calibri" panose="020F0502020204030204" pitchFamily="34" charset="0"/>
+                  <a:cs typeface="Calibri" panose="020F0502020204030204" pitchFamily="34" charset="0"/>
+                </a:rPr>
                 <a:t> deprecation </a:t>
               </a:r>
               <a:r>
-                <a:rPr lang="en-US" sz="1200" dirty="0" err="1"/>
+                <a:rPr lang="en-US" sz="1100" dirty="0" err="1">
+                  <a:latin typeface="Calibri" panose="020F0502020204030204" pitchFamily="34" charset="0"/>
+                  <a:cs typeface="Calibri" panose="020F0502020204030204" pitchFamily="34" charset="0"/>
+                </a:rPr>
                 <a:t>stringcase</a:t>
               </a:r>
-              <a:endParaRPr lang="en-US" sz="1200" dirty="0"/>
+              <a:endParaRPr lang="en-US" sz="1100" dirty="0">
+                <a:latin typeface="Calibri" panose="020F0502020204030204" pitchFamily="34" charset="0"/>
+                <a:cs typeface="Calibri" panose="020F0502020204030204" pitchFamily="34" charset="0"/>
+              </a:endParaRPr>
             </a:p>
             <a:p>
+              <a:pPr algn="ctr"/>
               <a:r>
-                <a:rPr lang="en-US" sz="1200" dirty="0"/>
-                <a:t>	make binary</a:t>
+                <a:rPr lang="en-US" sz="1100" dirty="0">
+                  <a:latin typeface="Calibri" panose="020F0502020204030204" pitchFamily="34" charset="0"/>
+                  <a:cs typeface="Calibri" panose="020F0502020204030204" pitchFamily="34" charset="0"/>
+                </a:rPr>
+                <a:t>make binary</a:t>
               </a:r>
             </a:p>
             <a:p>
+              <a:pPr algn="ctr"/>
               <a:r>
-                <a:rPr lang="en-US" sz="1200" dirty="0"/>
-                <a:t>	cp vss_rel_2.2-develop.binary </a:t>
+                <a:rPr lang="en-US" sz="1100" dirty="0">
+                  <a:latin typeface="Calibri" panose="020F0502020204030204" pitchFamily="34" charset="0"/>
+                  <a:cs typeface="Calibri" panose="020F0502020204030204" pitchFamily="34" charset="0"/>
+                </a:rPr>
+                <a:t>cp vss_rel_2.2-develop.binary </a:t>
               </a:r>
               <a:r>
-                <a:rPr lang="en-US" sz="1200" b="1" dirty="0">
+                <a:rPr lang="en-US" sz="1100" b="1" dirty="0">
                   <a:solidFill>
                     <a:srgbClr val="C00000"/>
                   </a:solidFill>
+                  <a:latin typeface="Calibri" panose="020F0502020204030204" pitchFamily="34" charset="0"/>
+                  <a:cs typeface="Calibri" panose="020F0502020204030204" pitchFamily="34" charset="0"/>
                 </a:rPr>
                 <a:t>vissv2.binary</a:t>
               </a:r>
@@ -3533,14 +3778,16 @@
         </p:nvSpPr>
         <p:spPr>
           <a:xfrm>
-            <a:off x="7019940" y="865063"/>
-            <a:ext cx="4605641" cy="4640384"/>
+            <a:off x="6637880" y="1183080"/>
+            <a:ext cx="3820570" cy="3874696"/>
           </a:xfrm>
           <a:prstGeom prst="roundRect">
             <a:avLst/>
           </a:prstGeom>
           <a:solidFill>
-            <a:schemeClr val="bg2">
+            <a:schemeClr val="accent4">
+              <a:lumMod val="20000"/>
+              <a:lumOff val="80000"/>
               <a:alpha val="90000"/>
             </a:schemeClr>
           </a:solidFill>
@@ -3566,10 +3813,12 @@
           <a:lstStyle/>
           <a:p>
             <a:pPr algn="ctr"/>
-            <a:endParaRPr lang="en-US" dirty="0">
+            <a:endParaRPr lang="en-US" sz="1600" dirty="0">
               <a:solidFill>
                 <a:schemeClr val="bg1"/>
               </a:solidFill>
+              <a:latin typeface="Calibri" panose="020F0502020204030204" pitchFamily="34" charset="0"/>
+              <a:cs typeface="Calibri" panose="020F0502020204030204" pitchFamily="34" charset="0"/>
             </a:endParaRPr>
           </a:p>
         </p:txBody>
@@ -3588,8 +3837,8 @@
         </p:nvSpPr>
         <p:spPr>
           <a:xfrm>
-            <a:off x="10228585" y="1547327"/>
-            <a:ext cx="1214843" cy="369333"/>
+            <a:off x="9235347" y="1526781"/>
+            <a:ext cx="788390" cy="369333"/>
           </a:xfrm>
           <a:prstGeom prst="roundRect">
             <a:avLst/>
@@ -3622,10 +3871,21 @@
           <a:p>
             <a:pPr algn="ctr"/>
             <a:r>
-              <a:rPr lang="en-US" dirty="0">
-                <a:latin typeface="Centaur" panose="02030504050205020304" pitchFamily="18" charset="0"/>
+              <a:rPr lang="en-US" sz="1100" dirty="0">
+                <a:latin typeface="Calibri" panose="020F0502020204030204" pitchFamily="34" charset="0"/>
+                <a:cs typeface="Calibri" panose="020F0502020204030204" pitchFamily="34" charset="0"/>
               </a:rPr>
-              <a:t>AGT 7500</a:t>
+              <a:t>AGT </a:t>
+            </a:r>
+          </a:p>
+          <a:p>
+            <a:pPr algn="ctr"/>
+            <a:r>
+              <a:rPr lang="en-US" sz="1100" dirty="0">
+                <a:latin typeface="Calibri" panose="020F0502020204030204" pitchFamily="34" charset="0"/>
+                <a:cs typeface="Calibri" panose="020F0502020204030204" pitchFamily="34" charset="0"/>
+              </a:rPr>
+              <a:t>7500</a:t>
             </a:r>
           </a:p>
         </p:txBody>
@@ -3644,8 +3904,8 @@
         </p:nvSpPr>
         <p:spPr>
           <a:xfrm>
-            <a:off x="10234116" y="2043412"/>
-            <a:ext cx="1214844" cy="357164"/>
+            <a:off x="9235346" y="2033166"/>
+            <a:ext cx="788391" cy="357164"/>
           </a:xfrm>
           <a:prstGeom prst="roundRect">
             <a:avLst/>
@@ -3678,10 +3938,21 @@
           <a:p>
             <a:pPr algn="ctr"/>
             <a:r>
-              <a:rPr lang="en-US" dirty="0">
-                <a:latin typeface="Centaur" panose="02030504050205020304" pitchFamily="18" charset="0"/>
+              <a:rPr lang="en-US" sz="1100" dirty="0">
+                <a:latin typeface="Calibri" panose="020F0502020204030204" pitchFamily="34" charset="0"/>
+                <a:cs typeface="Calibri" panose="020F0502020204030204" pitchFamily="34" charset="0"/>
               </a:rPr>
-              <a:t>AT 8600</a:t>
+              <a:t>AT </a:t>
+            </a:r>
+          </a:p>
+          <a:p>
+            <a:pPr algn="ctr"/>
+            <a:r>
+              <a:rPr lang="en-US" sz="1100" dirty="0">
+                <a:latin typeface="Calibri" panose="020F0502020204030204" pitchFamily="34" charset="0"/>
+                <a:cs typeface="Calibri" panose="020F0502020204030204" pitchFamily="34" charset="0"/>
+              </a:rPr>
+              <a:t>8600</a:t>
             </a:r>
           </a:p>
         </p:txBody>
@@ -3700,8 +3971,8 @@
         </p:nvSpPr>
         <p:spPr>
           <a:xfrm>
-            <a:off x="10004173" y="4684199"/>
-            <a:ext cx="1016000" cy="533397"/>
+            <a:off x="9144430" y="4447005"/>
+            <a:ext cx="562227" cy="406543"/>
           </a:xfrm>
           <a:prstGeom prst="roundRect">
             <a:avLst/>
@@ -3734,8 +4005,9 @@
           <a:p>
             <a:pPr algn="ctr"/>
             <a:r>
-              <a:rPr lang="en-US" dirty="0">
-                <a:latin typeface="Centaur" panose="02030504050205020304" pitchFamily="18" charset="0"/>
+              <a:rPr lang="en-US" sz="1100" dirty="0">
+                <a:latin typeface="Calibri" panose="020F0502020204030204" pitchFamily="34" charset="0"/>
+                <a:cs typeface="Calibri" panose="020F0502020204030204" pitchFamily="34" charset="0"/>
               </a:rPr>
               <a:t>WS </a:t>
             </a:r>
@@ -3743,8 +4015,9 @@
           <a:p>
             <a:pPr algn="ctr"/>
             <a:r>
-              <a:rPr lang="en-US" dirty="0">
-                <a:latin typeface="Centaur" panose="02030504050205020304" pitchFamily="18" charset="0"/>
+              <a:rPr lang="en-US" sz="1100" dirty="0">
+                <a:latin typeface="Calibri" panose="020F0502020204030204" pitchFamily="34" charset="0"/>
+                <a:cs typeface="Calibri" panose="020F0502020204030204" pitchFamily="34" charset="0"/>
               </a:rPr>
               <a:t>8101</a:t>
             </a:r>
@@ -3765,8 +4038,8 @@
         </p:nvSpPr>
         <p:spPr>
           <a:xfrm>
-            <a:off x="8560086" y="4676672"/>
-            <a:ext cx="1312334" cy="533397"/>
+            <a:off x="8143844" y="4455891"/>
+            <a:ext cx="741181" cy="414071"/>
           </a:xfrm>
           <a:prstGeom prst="roundRect">
             <a:avLst/>
@@ -3799,8 +4072,9 @@
           <a:p>
             <a:pPr algn="ctr"/>
             <a:r>
-              <a:rPr lang="en-US" dirty="0">
-                <a:latin typeface="Centaur" panose="02030504050205020304" pitchFamily="18" charset="0"/>
+              <a:rPr lang="en-US" sz="1100" dirty="0">
+                <a:latin typeface="Calibri" panose="020F0502020204030204" pitchFamily="34" charset="0"/>
+                <a:cs typeface="Calibri" panose="020F0502020204030204" pitchFamily="34" charset="0"/>
               </a:rPr>
               <a:t>HTTP </a:t>
             </a:r>
@@ -3808,8 +4082,9 @@
           <a:p>
             <a:pPr algn="ctr"/>
             <a:r>
-              <a:rPr lang="en-US" dirty="0">
-                <a:latin typeface="Centaur" panose="02030504050205020304" pitchFamily="18" charset="0"/>
+              <a:rPr lang="en-US" sz="1100" dirty="0">
+                <a:latin typeface="Calibri" panose="020F0502020204030204" pitchFamily="34" charset="0"/>
+                <a:cs typeface="Calibri" panose="020F0502020204030204" pitchFamily="34" charset="0"/>
               </a:rPr>
               <a:t>8100</a:t>
             </a:r>
@@ -3830,8 +4105,8 @@
         </p:nvSpPr>
         <p:spPr>
           <a:xfrm>
-            <a:off x="7418003" y="4676266"/>
-            <a:ext cx="1016000" cy="533397"/>
+            <a:off x="7303568" y="4454810"/>
+            <a:ext cx="704715" cy="414071"/>
           </a:xfrm>
           <a:prstGeom prst="roundRect">
             <a:avLst/>
@@ -3864,8 +4139,9 @@
           <a:p>
             <a:pPr algn="ctr"/>
             <a:r>
-              <a:rPr lang="en-US" dirty="0">
-                <a:latin typeface="Centaur" panose="02030504050205020304" pitchFamily="18" charset="0"/>
+              <a:rPr lang="en-US" sz="1100" dirty="0">
+                <a:latin typeface="Calibri" panose="020F0502020204030204" pitchFamily="34" charset="0"/>
+                <a:cs typeface="Calibri" panose="020F0502020204030204" pitchFamily="34" charset="0"/>
               </a:rPr>
               <a:t>MQTT </a:t>
             </a:r>
@@ -3873,8 +4149,9 @@
           <a:p>
             <a:pPr algn="ctr"/>
             <a:r>
-              <a:rPr lang="en-US" dirty="0">
-                <a:latin typeface="Centaur" panose="02030504050205020304" pitchFamily="18" charset="0"/>
+              <a:rPr lang="en-US" sz="1100" dirty="0">
+                <a:latin typeface="Calibri" panose="020F0502020204030204" pitchFamily="34" charset="0"/>
+                <a:cs typeface="Calibri" panose="020F0502020204030204" pitchFamily="34" charset="0"/>
               </a:rPr>
               <a:t>8102</a:t>
             </a:r>
@@ -3895,8 +4172,8 @@
         </p:nvSpPr>
         <p:spPr>
           <a:xfrm>
-            <a:off x="8560095" y="2873348"/>
-            <a:ext cx="1312334" cy="827785"/>
+            <a:off x="8033404" y="3032147"/>
+            <a:ext cx="939296" cy="583261"/>
           </a:xfrm>
           <a:prstGeom prst="roundRect">
             <a:avLst/>
@@ -3929,8 +4206,9 @@
           <a:p>
             <a:pPr algn="ctr"/>
             <a:r>
-              <a:rPr lang="en-US" dirty="0">
-                <a:latin typeface="Centaur" panose="02030504050205020304" pitchFamily="18" charset="0"/>
+              <a:rPr lang="en-US" sz="1100" dirty="0">
+                <a:latin typeface="Calibri" panose="020F0502020204030204" pitchFamily="34" charset="0"/>
+                <a:cs typeface="Calibri" panose="020F0502020204030204" pitchFamily="34" charset="0"/>
               </a:rPr>
               <a:t>8081</a:t>
             </a:r>
@@ -3938,8 +4216,9 @@
           <a:p>
             <a:pPr algn="ctr"/>
             <a:r>
-              <a:rPr lang="en-US" dirty="0">
-                <a:latin typeface="Centaur" panose="02030504050205020304" pitchFamily="18" charset="0"/>
+              <a:rPr lang="en-US" sz="1100" dirty="0">
+                <a:latin typeface="Calibri" panose="020F0502020204030204" pitchFamily="34" charset="0"/>
+                <a:cs typeface="Calibri" panose="020F0502020204030204" pitchFamily="34" charset="0"/>
               </a:rPr>
               <a:t>Server Core</a:t>
             </a:r>
@@ -3947,8 +4226,9 @@
           <a:p>
             <a:pPr algn="ctr"/>
             <a:r>
-              <a:rPr lang="en-US" dirty="0">
-                <a:latin typeface="Centaur" panose="02030504050205020304" pitchFamily="18" charset="0"/>
+              <a:rPr lang="en-US" sz="1100" dirty="0">
+                <a:latin typeface="Calibri" panose="020F0502020204030204" pitchFamily="34" charset="0"/>
+                <a:cs typeface="Calibri" panose="020F0502020204030204" pitchFamily="34" charset="0"/>
               </a:rPr>
               <a:t>8082</a:t>
             </a:r>
@@ -3969,8 +4249,8 @@
         </p:nvSpPr>
         <p:spPr>
           <a:xfrm>
-            <a:off x="8552544" y="1549991"/>
-            <a:ext cx="1305983" cy="846859"/>
+            <a:off x="8033405" y="1956957"/>
+            <a:ext cx="939296" cy="506568"/>
           </a:xfrm>
           <a:prstGeom prst="roundRect">
             <a:avLst/>
@@ -4003,26 +4283,30 @@
           <a:p>
             <a:pPr algn="ctr"/>
             <a:r>
-              <a:rPr lang="en-US" dirty="0">
-                <a:latin typeface="Centaur" panose="02030504050205020304" pitchFamily="18" charset="0"/>
+              <a:rPr lang="en-US" sz="1100" dirty="0">
+                <a:latin typeface="Calibri" panose="020F0502020204030204" pitchFamily="34" charset="0"/>
+                <a:cs typeface="Calibri" panose="020F0502020204030204" pitchFamily="34" charset="0"/>
               </a:rPr>
               <a:t>Service </a:t>
             </a:r>
             <a:r>
-              <a:rPr lang="en-US" dirty="0" err="1">
-                <a:latin typeface="Centaur" panose="02030504050205020304" pitchFamily="18" charset="0"/>
+              <a:rPr lang="en-US" sz="1100" dirty="0" err="1">
+                <a:latin typeface="Calibri" panose="020F0502020204030204" pitchFamily="34" charset="0"/>
+                <a:cs typeface="Calibri" panose="020F0502020204030204" pitchFamily="34" charset="0"/>
               </a:rPr>
               <a:t>Mgr</a:t>
             </a:r>
-            <a:endParaRPr lang="en-US" dirty="0">
-              <a:latin typeface="Centaur" panose="02030504050205020304" pitchFamily="18" charset="0"/>
+            <a:endParaRPr lang="en-US" sz="1100" dirty="0">
+              <a:latin typeface="Calibri" panose="020F0502020204030204" pitchFamily="34" charset="0"/>
+              <a:cs typeface="Calibri" panose="020F0502020204030204" pitchFamily="34" charset="0"/>
             </a:endParaRPr>
           </a:p>
           <a:p>
             <a:pPr algn="ctr"/>
             <a:r>
-              <a:rPr lang="en-US" dirty="0">
-                <a:latin typeface="Centaur" panose="02030504050205020304" pitchFamily="18" charset="0"/>
+              <a:rPr lang="en-US" sz="1100" dirty="0">
+                <a:latin typeface="Calibri" panose="020F0502020204030204" pitchFamily="34" charset="0"/>
+                <a:cs typeface="Calibri" panose="020F0502020204030204" pitchFamily="34" charset="0"/>
               </a:rPr>
               <a:t>8200</a:t>
             </a:r>
@@ -4043,8 +4327,8 @@
         </p:nvSpPr>
         <p:spPr>
           <a:xfrm>
-            <a:off x="7250713" y="1541524"/>
-            <a:ext cx="872005" cy="867720"/>
+            <a:off x="6868762" y="1778150"/>
+            <a:ext cx="872005" cy="873018"/>
           </a:xfrm>
           <a:prstGeom prst="flowChartMagneticDisk">
             <a:avLst/>
@@ -4077,8 +4361,9 @@
           <a:p>
             <a:pPr algn="ctr"/>
             <a:r>
-              <a:rPr lang="en-US" sz="1400" dirty="0">
-                <a:latin typeface="Centaur" panose="02030504050205020304" pitchFamily="18" charset="0"/>
+              <a:rPr lang="en-US" sz="1200" dirty="0">
+                <a:latin typeface="Calibri" panose="020F0502020204030204" pitchFamily="34" charset="0"/>
+                <a:cs typeface="Calibri" panose="020F0502020204030204" pitchFamily="34" charset="0"/>
               </a:rPr>
               <a:t>(optional)</a:t>
             </a:r>
@@ -4086,8 +4371,9 @@
           <a:p>
             <a:pPr algn="ctr"/>
             <a:r>
-              <a:rPr lang="en-US" sz="1400" dirty="0">
-                <a:latin typeface="Centaur" panose="02030504050205020304" pitchFamily="18" charset="0"/>
+              <a:rPr lang="en-US" sz="1200" dirty="0">
+                <a:latin typeface="Calibri" panose="020F0502020204030204" pitchFamily="34" charset="0"/>
+                <a:cs typeface="Calibri" panose="020F0502020204030204" pitchFamily="34" charset="0"/>
               </a:rPr>
               <a:t>State </a:t>
             </a:r>
@@ -4095,8 +4381,9 @@
           <a:p>
             <a:pPr algn="ctr"/>
             <a:r>
-              <a:rPr lang="en-US" sz="1400" dirty="0">
-                <a:latin typeface="Centaur" panose="02030504050205020304" pitchFamily="18" charset="0"/>
+              <a:rPr lang="en-US" sz="1200" dirty="0">
+                <a:latin typeface="Calibri" panose="020F0502020204030204" pitchFamily="34" charset="0"/>
+                <a:cs typeface="Calibri" panose="020F0502020204030204" pitchFamily="34" charset="0"/>
               </a:rPr>
               <a:t>storage</a:t>
             </a:r>
@@ -4121,8 +4408,8 @@
         </p:nvCxnSpPr>
         <p:spPr>
           <a:xfrm rot="5400000">
-            <a:off x="8083567" y="3543570"/>
-            <a:ext cx="975133" cy="1290259"/>
+            <a:off x="7659788" y="3611546"/>
+            <a:ext cx="839402" cy="847126"/>
           </a:xfrm>
           <a:prstGeom prst="bentConnector3">
             <a:avLst/>
@@ -4164,8 +4451,8 @@
         </p:nvCxnSpPr>
         <p:spPr>
           <a:xfrm rot="16200000" flipH="1">
-            <a:off x="9372684" y="3544710"/>
-            <a:ext cx="983066" cy="1295911"/>
+            <a:off x="8548500" y="3569960"/>
+            <a:ext cx="831597" cy="922492"/>
           </a:xfrm>
           <a:prstGeom prst="bentConnector3">
             <a:avLst/>
@@ -4206,9 +4493,9 @@
           <p:nvPr/>
         </p:nvCxnSpPr>
         <p:spPr>
-          <a:xfrm flipH="1">
-            <a:off x="9216253" y="3701133"/>
-            <a:ext cx="9" cy="975539"/>
+          <a:xfrm>
+            <a:off x="8503052" y="3615408"/>
+            <a:ext cx="11383" cy="840483"/>
           </a:xfrm>
           <a:prstGeom prst="straightConnector1">
             <a:avLst/>
@@ -4246,8 +4533,8 @@
         </p:nvSpPr>
         <p:spPr>
           <a:xfrm>
-            <a:off x="7729351" y="872661"/>
-            <a:ext cx="3611418" cy="369332"/>
+            <a:off x="6787049" y="1206772"/>
+            <a:ext cx="3611418" cy="307777"/>
           </a:xfrm>
           <a:prstGeom prst="rect">
             <a:avLst/>
@@ -4260,34 +4547,46 @@
           </a:bodyPr>
           <a:lstStyle/>
           <a:p>
-            <a:r>
-              <a:rPr lang="en-US" dirty="0" err="1">
+            <a:pPr algn="ctr"/>
+            <a:r>
+              <a:rPr lang="en-US" sz="1400" dirty="0" err="1">
                 <a:solidFill>
                   <a:schemeClr val="accent1"/>
                 </a:solidFill>
+                <a:latin typeface="Calibri" panose="020F0502020204030204" pitchFamily="34" charset="0"/>
+                <a:cs typeface="Calibri" panose="020F0502020204030204" pitchFamily="34" charset="0"/>
+                <a:hlinkClick r:id="rId4"/>
               </a:rPr>
               <a:t>git@github.com:MEAE-GOT</a:t>
             </a:r>
             <a:r>
-              <a:rPr lang="en-US" dirty="0">
+              <a:rPr lang="en-US" sz="1400" dirty="0">
                 <a:solidFill>
                   <a:schemeClr val="accent1"/>
                 </a:solidFill>
+                <a:latin typeface="Calibri" panose="020F0502020204030204" pitchFamily="34" charset="0"/>
+                <a:cs typeface="Calibri" panose="020F0502020204030204" pitchFamily="34" charset="0"/>
+                <a:hlinkClick r:id="rId4"/>
               </a:rPr>
               <a:t>/</a:t>
             </a:r>
             <a:r>
-              <a:rPr lang="en-US" dirty="0" err="1">
+              <a:rPr lang="en-US" sz="1400" dirty="0" err="1">
                 <a:solidFill>
                   <a:schemeClr val="accent1"/>
                 </a:solidFill>
+                <a:latin typeface="Calibri" panose="020F0502020204030204" pitchFamily="34" charset="0"/>
+                <a:cs typeface="Calibri" panose="020F0502020204030204" pitchFamily="34" charset="0"/>
+                <a:hlinkClick r:id="rId4"/>
               </a:rPr>
               <a:t>WAII.git</a:t>
             </a:r>
-            <a:endParaRPr lang="en-US" dirty="0">
+            <a:endParaRPr lang="en-US" sz="1400" dirty="0">
               <a:solidFill>
                 <a:schemeClr val="accent1"/>
               </a:solidFill>
+              <a:latin typeface="Calibri" panose="020F0502020204030204" pitchFamily="34" charset="0"/>
+              <a:cs typeface="Calibri" panose="020F0502020204030204" pitchFamily="34" charset="0"/>
             </a:endParaRPr>
           </a:p>
         </p:txBody>
@@ -4309,9 +4608,9 @@
           <p:nvPr/>
         </p:nvCxnSpPr>
         <p:spPr>
-          <a:xfrm>
-            <a:off x="9205536" y="2396850"/>
-            <a:ext cx="10726" cy="476498"/>
+          <a:xfrm flipH="1">
+            <a:off x="8503052" y="2463525"/>
+            <a:ext cx="1" cy="568622"/>
           </a:xfrm>
           <a:prstGeom prst="straightConnector1">
             <a:avLst/>
@@ -4349,8 +4648,8 @@
         </p:nvSpPr>
         <p:spPr>
           <a:xfrm>
-            <a:off x="8459749" y="3635971"/>
-            <a:ext cx="1541063" cy="369332"/>
+            <a:off x="8050174" y="3588346"/>
+            <a:ext cx="1015021" cy="261610"/>
           </a:xfrm>
           <a:prstGeom prst="rect">
             <a:avLst/>
@@ -4364,7 +4663,10 @@
           <a:lstStyle/>
           <a:p>
             <a:r>
-              <a:rPr lang="en-US" dirty="0"/>
+              <a:rPr lang="en-US" sz="1100" dirty="0">
+                <a:latin typeface="Calibri" panose="020F0502020204030204" pitchFamily="34" charset="0"/>
+                <a:cs typeface="Calibri" panose="020F0502020204030204" pitchFamily="34" charset="0"/>
+              </a:rPr>
               <a:t>/transport/reg</a:t>
             </a:r>
           </a:p>
@@ -4384,8 +4686,8 @@
         </p:nvSpPr>
         <p:spPr>
           <a:xfrm>
-            <a:off x="8598945" y="2479339"/>
-            <a:ext cx="1319079" cy="369332"/>
+            <a:off x="8064031" y="2746882"/>
+            <a:ext cx="880369" cy="261610"/>
           </a:xfrm>
           <a:prstGeom prst="rect">
             <a:avLst/>
@@ -4399,7 +4701,10 @@
           <a:lstStyle/>
           <a:p>
             <a:r>
-              <a:rPr lang="en-US" dirty="0"/>
+              <a:rPr lang="en-US" sz="1100" dirty="0">
+                <a:latin typeface="Calibri" panose="020F0502020204030204" pitchFamily="34" charset="0"/>
+                <a:cs typeface="Calibri" panose="020F0502020204030204" pitchFamily="34" charset="0"/>
+              </a:rPr>
               <a:t>/service/reg</a:t>
             </a:r>
           </a:p>
@@ -4419,16 +4724,16 @@
         </p:nvSpPr>
         <p:spPr>
           <a:xfrm>
-            <a:off x="264364" y="2474677"/>
-            <a:ext cx="5135370" cy="3030770"/>
+            <a:off x="558413" y="4714875"/>
+            <a:ext cx="3670687" cy="1543050"/>
           </a:xfrm>
           <a:prstGeom prst="roundRect">
             <a:avLst/>
           </a:prstGeom>
           <a:solidFill>
-            <a:schemeClr val="bg2">
-              <a:alpha val="90000"/>
-            </a:schemeClr>
+            <a:srgbClr val="E8B3F3">
+              <a:alpha val="28000"/>
+            </a:srgbClr>
           </a:solidFill>
         </p:spPr>
         <p:style>
@@ -4448,60 +4753,119 @@
           </a:fontRef>
         </p:style>
         <p:txBody>
-          <a:bodyPr rtlCol="0" anchor="ctr"/>
+          <a:bodyPr rtlCol="0" anchor="t"/>
           <a:lstStyle/>
           <a:p>
             <a:pPr algn="ctr"/>
-            <a:endParaRPr lang="en-US" dirty="0">
-              <a:solidFill>
-                <a:schemeClr val="bg1"/>
-              </a:solidFill>
+            <a:r>
+              <a:rPr lang="en-US" sz="1400" dirty="0" err="1">
+                <a:latin typeface="Calibri" panose="020F0502020204030204" pitchFamily="34" charset="0"/>
+                <a:cs typeface="Calibri" panose="020F0502020204030204" pitchFamily="34" charset="0"/>
+                <a:hlinkClick r:id="rId2"/>
+              </a:rPr>
+              <a:t>git@github.com:COVESA</a:t>
+            </a:r>
+            <a:r>
+              <a:rPr lang="en-US" sz="1400" dirty="0">
+                <a:latin typeface="Calibri" panose="020F0502020204030204" pitchFamily="34" charset="0"/>
+                <a:cs typeface="Calibri" panose="020F0502020204030204" pitchFamily="34" charset="0"/>
+                <a:hlinkClick r:id="rId2"/>
+              </a:rPr>
+              <a:t>/ccs-</a:t>
+            </a:r>
+            <a:r>
+              <a:rPr lang="en-US" sz="1400" dirty="0" err="1">
+                <a:latin typeface="Calibri" panose="020F0502020204030204" pitchFamily="34" charset="0"/>
+                <a:cs typeface="Calibri" panose="020F0502020204030204" pitchFamily="34" charset="0"/>
+                <a:hlinkClick r:id="rId2"/>
+              </a:rPr>
+              <a:t>components.git</a:t>
+            </a:r>
+            <a:endParaRPr lang="en-US" sz="1400" dirty="0">
+              <a:latin typeface="Calibri" panose="020F0502020204030204" pitchFamily="34" charset="0"/>
+              <a:cs typeface="Calibri" panose="020F0502020204030204" pitchFamily="34" charset="0"/>
             </a:endParaRPr>
           </a:p>
-        </p:txBody>
-      </p:sp>
-      <p:sp>
-        <p:nvSpPr>
-          <p:cNvPr id="55" name="TextBox 54">
-            <a:extLst>
-              <a:ext uri="{FF2B5EF4-FFF2-40B4-BE49-F238E27FC236}">
-                <a16:creationId xmlns:a16="http://schemas.microsoft.com/office/drawing/2014/main" id="{5C7CCC7D-165E-40CB-A30E-B31A8FF7C67E}"/>
-              </a:ext>
-            </a:extLst>
-          </p:cNvPr>
-          <p:cNvSpPr txBox="1"/>
-          <p:nvPr/>
-        </p:nvSpPr>
-        <p:spPr>
-          <a:xfrm>
-            <a:off x="566419" y="2493785"/>
-            <a:ext cx="4241414" cy="369332"/>
-          </a:xfrm>
-          <a:prstGeom prst="rect">
-            <a:avLst/>
-          </a:prstGeom>
-          <a:noFill/>
-        </p:spPr>
-        <p:txBody>
-          <a:bodyPr wrap="square">
-            <a:spAutoFit/>
-          </a:bodyPr>
-          <a:lstStyle/>
           <a:p>
             <a:pPr algn="ctr"/>
             <a:r>
-              <a:rPr lang="en-US" dirty="0" err="1">
-                <a:hlinkClick r:id="rId3"/>
+              <a:rPr lang="en-US" sz="1100" b="1" dirty="0">
+                <a:solidFill>
+                  <a:schemeClr val="tx1"/>
+                </a:solidFill>
+                <a:latin typeface="Calibri" panose="020F0502020204030204" pitchFamily="34" charset="0"/>
+                <a:cs typeface="Calibri" panose="020F0502020204030204" pitchFamily="34" charset="0"/>
               </a:rPr>
-              <a:t>git@github.com:GENIVI</a:t>
-            </a:r>
-            <a:r>
-              <a:rPr lang="en-US" dirty="0">
-                <a:hlinkClick r:id="rId3"/>
+              <a:t>Vehicle to Cloud via OVDS client </a:t>
+            </a:r>
+          </a:p>
+          <a:p>
+            <a:pPr algn="ctr"/>
+            <a:r>
+              <a:rPr lang="en-US" sz="1100" b="1" dirty="0">
+                <a:solidFill>
+                  <a:schemeClr val="tx1"/>
+                </a:solidFill>
+                <a:latin typeface="Calibri" panose="020F0502020204030204" pitchFamily="34" charset="0"/>
+                <a:cs typeface="Calibri" panose="020F0502020204030204" pitchFamily="34" charset="0"/>
               </a:rPr>
-              <a:t>/ccs-w3c-client.git</a:t>
-            </a:r>
-            <a:endParaRPr lang="en-US" dirty="0"/>
+              <a:t>(</a:t>
+            </a:r>
+            <a:r>
+              <a:rPr lang="en-US" sz="1100" b="1" i="0" dirty="0">
+                <a:solidFill>
+                  <a:schemeClr val="tx1"/>
+                </a:solidFill>
+                <a:effectLst/>
+                <a:latin typeface="Calibri" panose="020F0502020204030204" pitchFamily="34" charset="0"/>
+                <a:cs typeface="Calibri" panose="020F0502020204030204" pitchFamily="34" charset="0"/>
+              </a:rPr>
+              <a:t>./</a:t>
+            </a:r>
+            <a:r>
+              <a:rPr lang="en-US" sz="1100" b="1" i="0" dirty="0" err="1">
+                <a:solidFill>
+                  <a:schemeClr val="tx1"/>
+                </a:solidFill>
+                <a:effectLst/>
+                <a:latin typeface="Calibri" panose="020F0502020204030204" pitchFamily="34" charset="0"/>
+                <a:cs typeface="Calibri" panose="020F0502020204030204" pitchFamily="34" charset="0"/>
+              </a:rPr>
+              <a:t>ovds_server</a:t>
+            </a:r>
+            <a:r>
+              <a:rPr lang="en-US" sz="1100" b="1" i="0" dirty="0">
+                <a:solidFill>
+                  <a:schemeClr val="tx1"/>
+                </a:solidFill>
+                <a:effectLst/>
+                <a:latin typeface="Calibri" panose="020F0502020204030204" pitchFamily="34" charset="0"/>
+                <a:cs typeface="Calibri" panose="020F0502020204030204" pitchFamily="34" charset="0"/>
+              </a:rPr>
+              <a:t> </a:t>
+            </a:r>
+            <a:r>
+              <a:rPr lang="en-US" sz="1100" b="1" i="0" dirty="0" err="1">
+                <a:solidFill>
+                  <a:schemeClr val="tx1"/>
+                </a:solidFill>
+                <a:effectLst/>
+                <a:latin typeface="Calibri" panose="020F0502020204030204" pitchFamily="34" charset="0"/>
+                <a:cs typeface="Calibri" panose="020F0502020204030204" pitchFamily="34" charset="0"/>
+              </a:rPr>
+              <a:t>db</a:t>
+            </a:r>
+            <a:r>
+              <a:rPr lang="en-US" sz="1100" b="1" i="0" dirty="0">
+                <a:solidFill>
+                  <a:schemeClr val="tx1"/>
+                </a:solidFill>
+                <a:effectLst/>
+                <a:latin typeface="Calibri" panose="020F0502020204030204" pitchFamily="34" charset="0"/>
+                <a:cs typeface="Calibri" panose="020F0502020204030204" pitchFamily="34" charset="0"/>
+              </a:rPr>
+              <a:t>-file-name)</a:t>
+            </a:r>
           </a:p>
         </p:txBody>
       </p:sp>
@@ -4519,8 +4883,8 @@
         </p:nvSpPr>
         <p:spPr>
           <a:xfrm>
-            <a:off x="1790648" y="3839184"/>
-            <a:ext cx="869575" cy="649863"/>
+            <a:off x="1944291" y="5664651"/>
+            <a:ext cx="662091" cy="385161"/>
           </a:xfrm>
           <a:prstGeom prst="roundRect">
             <a:avLst/>
@@ -4553,8 +4917,9 @@
           <a:p>
             <a:pPr algn="ctr"/>
             <a:r>
-              <a:rPr lang="en-US" dirty="0">
-                <a:latin typeface="Centaur" panose="02030504050205020304" pitchFamily="18" charset="0"/>
+              <a:rPr lang="en-US" sz="1100" dirty="0">
+                <a:latin typeface="Calibri" panose="020F0502020204030204" pitchFamily="34" charset="0"/>
+                <a:cs typeface="Calibri" panose="020F0502020204030204" pitchFamily="34" charset="0"/>
               </a:rPr>
               <a:t>OVDS Server</a:t>
             </a:r>
@@ -4575,8 +4940,8 @@
         </p:nvSpPr>
         <p:spPr>
           <a:xfrm>
-            <a:off x="2903860" y="3835400"/>
-            <a:ext cx="1047372" cy="649863"/>
+            <a:off x="3082938" y="2020816"/>
+            <a:ext cx="499569" cy="385161"/>
           </a:xfrm>
           <a:prstGeom prst="roundRect">
             <a:avLst/>
@@ -4609,8 +4974,9 @@
           <a:p>
             <a:pPr algn="ctr"/>
             <a:r>
-              <a:rPr lang="en-US" dirty="0">
-                <a:latin typeface="Centaur" panose="02030504050205020304" pitchFamily="18" charset="0"/>
+              <a:rPr lang="en-US" sz="1100" dirty="0">
+                <a:latin typeface="Calibri" panose="020F0502020204030204" pitchFamily="34" charset="0"/>
+                <a:cs typeface="Calibri" panose="020F0502020204030204" pitchFamily="34" charset="0"/>
               </a:rPr>
               <a:t>Live Sim</a:t>
             </a:r>
@@ -4619,47 +4985,6 @@
       </p:sp>
       <p:sp>
         <p:nvSpPr>
-          <p:cNvPr id="77" name="TextBox 76">
-            <a:extLst>
-              <a:ext uri="{FF2B5EF4-FFF2-40B4-BE49-F238E27FC236}">
-                <a16:creationId xmlns:a16="http://schemas.microsoft.com/office/drawing/2014/main" id="{790A9938-DB25-433F-B141-AF92A507B08A}"/>
-              </a:ext>
-            </a:extLst>
-          </p:cNvPr>
-          <p:cNvSpPr txBox="1"/>
-          <p:nvPr/>
-        </p:nvSpPr>
-        <p:spPr>
-          <a:xfrm>
-            <a:off x="3881240" y="3924960"/>
-            <a:ext cx="1630190" cy="461665"/>
-          </a:xfrm>
-          <a:prstGeom prst="rect">
-            <a:avLst/>
-          </a:prstGeom>
-          <a:noFill/>
-        </p:spPr>
-        <p:txBody>
-          <a:bodyPr wrap="none" rtlCol="0">
-            <a:spAutoFit/>
-          </a:bodyPr>
-          <a:lstStyle/>
-          <a:p>
-            <a:r>
-              <a:rPr lang="en-US" sz="1200" dirty="0"/>
-              <a:t>WRITE  Periodically</a:t>
-            </a:r>
-          </a:p>
-          <a:p>
-            <a:r>
-              <a:rPr lang="en-US" sz="1200" dirty="0"/>
-              <a:t>(DB Timestamp based)</a:t>
-            </a:r>
-          </a:p>
-        </p:txBody>
-      </p:sp>
-      <p:sp>
-        <p:nvSpPr>
           <p:cNvPr id="81" name="Flowchart: Magnetic Disk 80">
             <a:extLst>
               <a:ext uri="{FF2B5EF4-FFF2-40B4-BE49-F238E27FC236}">
@@ -4672,8 +4997,8 @@
         </p:nvSpPr>
         <p:spPr>
           <a:xfrm>
-            <a:off x="413374" y="3845210"/>
-            <a:ext cx="1016000" cy="649863"/>
+            <a:off x="1018128" y="5664651"/>
+            <a:ext cx="652680" cy="391187"/>
           </a:xfrm>
           <a:prstGeom prst="flowChartMagneticDisk">
             <a:avLst/>
@@ -4706,8 +5031,9 @@
           <a:p>
             <a:pPr algn="ctr"/>
             <a:r>
-              <a:rPr lang="en-US" sz="1400" dirty="0">
-                <a:latin typeface="Centaur" panose="02030504050205020304" pitchFamily="18" charset="0"/>
+              <a:rPr lang="en-US" sz="1200" dirty="0">
+                <a:latin typeface="Calibri" panose="020F0502020204030204" pitchFamily="34" charset="0"/>
+                <a:cs typeface="Calibri" panose="020F0502020204030204" pitchFamily="34" charset="0"/>
               </a:rPr>
               <a:t>OVDS</a:t>
             </a:r>
@@ -4728,8 +5054,8 @@
         </p:nvSpPr>
         <p:spPr>
           <a:xfrm>
-            <a:off x="1790407" y="4684199"/>
-            <a:ext cx="869575" cy="569171"/>
+            <a:off x="3043517" y="5664651"/>
+            <a:ext cx="662090" cy="385161"/>
           </a:xfrm>
           <a:prstGeom prst="roundRect">
             <a:avLst/>
@@ -4762,8 +5088,9 @@
           <a:p>
             <a:pPr algn="ctr"/>
             <a:r>
-              <a:rPr lang="en-US" dirty="0">
-                <a:latin typeface="Centaur" panose="02030504050205020304" pitchFamily="18" charset="0"/>
+              <a:rPr lang="en-US" sz="1100" dirty="0">
+                <a:latin typeface="Calibri" panose="020F0502020204030204" pitchFamily="34" charset="0"/>
+                <a:cs typeface="Calibri" panose="020F0502020204030204" pitchFamily="34" charset="0"/>
               </a:rPr>
               <a:t>OVDS Client</a:t>
             </a:r>
@@ -4781,15 +5108,15 @@
           </p:cNvPr>
           <p:cNvCxnSpPr>
             <a:cxnSpLocks/>
-            <a:stCxn id="85" idx="0"/>
-            <a:endCxn id="58" idx="2"/>
+            <a:stCxn id="85" idx="1"/>
+            <a:endCxn id="58" idx="3"/>
           </p:cNvCxnSpPr>
           <p:nvPr/>
         </p:nvCxnSpPr>
         <p:spPr>
-          <a:xfrm flipV="1">
-            <a:off x="2225195" y="4489047"/>
-            <a:ext cx="241" cy="195152"/>
+          <a:xfrm flipH="1">
+            <a:off x="2606382" y="5857232"/>
+            <a:ext cx="437135" cy="0"/>
           </a:xfrm>
           <a:prstGeom prst="straightConnector1">
             <a:avLst/>
@@ -4823,6 +5150,7 @@
             </a:extLst>
           </p:cNvPr>
           <p:cNvCxnSpPr>
+            <a:cxnSpLocks/>
             <a:stCxn id="58" idx="1"/>
             <a:endCxn id="81" idx="4"/>
           </p:cNvCxnSpPr>
@@ -4830,8 +5158,8 @@
         </p:nvCxnSpPr>
         <p:spPr>
           <a:xfrm flipH="1">
-            <a:off x="1429374" y="4164116"/>
-            <a:ext cx="361274" cy="6026"/>
+            <a:off x="1670808" y="5857232"/>
+            <a:ext cx="273483" cy="3013"/>
           </a:xfrm>
           <a:prstGeom prst="straightConnector1">
             <a:avLst/>
@@ -4856,187 +5184,6 @@
           </a:fontRef>
         </p:style>
       </p:cxnSp>
-      <p:cxnSp>
-        <p:nvCxnSpPr>
-          <p:cNvPr id="131" name="Straight Arrow Connector 130">
-            <a:extLst>
-              <a:ext uri="{FF2B5EF4-FFF2-40B4-BE49-F238E27FC236}">
-                <a16:creationId xmlns:a16="http://schemas.microsoft.com/office/drawing/2014/main" id="{92C1A2B9-6630-41C3-9474-5C6673EA9BB7}"/>
-              </a:ext>
-            </a:extLst>
-          </p:cNvPr>
-          <p:cNvCxnSpPr>
-            <a:cxnSpLocks/>
-            <a:stCxn id="58" idx="3"/>
-            <a:endCxn id="60" idx="1"/>
-          </p:cNvCxnSpPr>
-          <p:nvPr/>
-        </p:nvCxnSpPr>
-        <p:spPr>
-          <a:xfrm flipV="1">
-            <a:off x="2660223" y="4160332"/>
-            <a:ext cx="243637" cy="3784"/>
-          </a:xfrm>
-          <a:prstGeom prst="straightConnector1">
-            <a:avLst/>
-          </a:prstGeom>
-          <a:ln>
-            <a:tailEnd type="triangle"/>
-          </a:ln>
-        </p:spPr>
-        <p:style>
-          <a:lnRef idx="1">
-            <a:schemeClr val="accent1"/>
-          </a:lnRef>
-          <a:fillRef idx="0">
-            <a:schemeClr val="accent1"/>
-          </a:fillRef>
-          <a:effectRef idx="0">
-            <a:schemeClr val="accent1"/>
-          </a:effectRef>
-          <a:fontRef idx="minor">
-            <a:schemeClr val="tx1"/>
-          </a:fontRef>
-        </p:style>
-      </p:cxnSp>
-      <p:cxnSp>
-        <p:nvCxnSpPr>
-          <p:cNvPr id="137" name="Connector: Elbow 136">
-            <a:extLst>
-              <a:ext uri="{FF2B5EF4-FFF2-40B4-BE49-F238E27FC236}">
-                <a16:creationId xmlns:a16="http://schemas.microsoft.com/office/drawing/2014/main" id="{0A2325C1-4071-4923-8110-4EFE8CAFA8F9}"/>
-              </a:ext>
-            </a:extLst>
-          </p:cNvPr>
-          <p:cNvCxnSpPr>
-            <a:cxnSpLocks/>
-            <a:stCxn id="60" idx="3"/>
-            <a:endCxn id="11" idx="2"/>
-          </p:cNvCxnSpPr>
-          <p:nvPr/>
-        </p:nvCxnSpPr>
-        <p:spPr>
-          <a:xfrm flipV="1">
-            <a:off x="3951232" y="1975384"/>
-            <a:ext cx="3299481" cy="2184948"/>
-          </a:xfrm>
-          <a:prstGeom prst="bentConnector3">
-            <a:avLst>
-              <a:gd name="adj1" fmla="val 50000"/>
-            </a:avLst>
-          </a:prstGeom>
-          <a:ln>
-            <a:solidFill>
-              <a:srgbClr val="C00000"/>
-            </a:solidFill>
-            <a:tailEnd type="triangle"/>
-          </a:ln>
-        </p:spPr>
-        <p:style>
-          <a:lnRef idx="1">
-            <a:schemeClr val="accent1"/>
-          </a:lnRef>
-          <a:fillRef idx="0">
-            <a:schemeClr val="accent1"/>
-          </a:fillRef>
-          <a:effectRef idx="0">
-            <a:schemeClr val="accent1"/>
-          </a:effectRef>
-          <a:fontRef idx="minor">
-            <a:schemeClr val="tx1"/>
-          </a:fontRef>
-        </p:style>
-      </p:cxnSp>
-      <p:cxnSp>
-        <p:nvCxnSpPr>
-          <p:cNvPr id="159" name="Connector: Elbow 158">
-            <a:extLst>
-              <a:ext uri="{FF2B5EF4-FFF2-40B4-BE49-F238E27FC236}">
-                <a16:creationId xmlns:a16="http://schemas.microsoft.com/office/drawing/2014/main" id="{4D0EBDE9-DC10-4D33-BB55-0CD50E17ED32}"/>
-              </a:ext>
-            </a:extLst>
-          </p:cNvPr>
-          <p:cNvCxnSpPr>
-            <a:cxnSpLocks/>
-            <a:stCxn id="85" idx="2"/>
-            <a:endCxn id="7" idx="2"/>
-          </p:cNvCxnSpPr>
-          <p:nvPr/>
-        </p:nvCxnSpPr>
-        <p:spPr>
-          <a:xfrm rot="5400000" flipH="1" flipV="1">
-            <a:off x="5699073" y="1736191"/>
-            <a:ext cx="43301" cy="6991058"/>
-          </a:xfrm>
-          <a:prstGeom prst="bentConnector3">
-            <a:avLst>
-              <a:gd name="adj1" fmla="val -2561454"/>
-            </a:avLst>
-          </a:prstGeom>
-          <a:ln>
-            <a:tailEnd type="triangle"/>
-          </a:ln>
-        </p:spPr>
-        <p:style>
-          <a:lnRef idx="1">
-            <a:schemeClr val="accent1"/>
-          </a:lnRef>
-          <a:fillRef idx="0">
-            <a:schemeClr val="accent1"/>
-          </a:fillRef>
-          <a:effectRef idx="0">
-            <a:schemeClr val="accent1"/>
-          </a:effectRef>
-          <a:fontRef idx="minor">
-            <a:schemeClr val="tx1"/>
-          </a:fontRef>
-        </p:style>
-      </p:cxnSp>
-      <p:cxnSp>
-        <p:nvCxnSpPr>
-          <p:cNvPr id="164" name="Connector: Elbow 163">
-            <a:extLst>
-              <a:ext uri="{FF2B5EF4-FFF2-40B4-BE49-F238E27FC236}">
-                <a16:creationId xmlns:a16="http://schemas.microsoft.com/office/drawing/2014/main" id="{0C2835CF-8B7C-45F3-A227-47993FDB25B2}"/>
-              </a:ext>
-            </a:extLst>
-          </p:cNvPr>
-          <p:cNvCxnSpPr>
-            <a:cxnSpLocks/>
-            <a:stCxn id="85" idx="2"/>
-            <a:endCxn id="6" idx="2"/>
-          </p:cNvCxnSpPr>
-          <p:nvPr/>
-        </p:nvCxnSpPr>
-        <p:spPr>
-          <a:xfrm rot="5400000" flipH="1" flipV="1">
-            <a:off x="6350797" y="1091994"/>
-            <a:ext cx="35774" cy="8286978"/>
-          </a:xfrm>
-          <a:prstGeom prst="bentConnector3">
-            <a:avLst>
-              <a:gd name="adj1" fmla="val -3100389"/>
-            </a:avLst>
-          </a:prstGeom>
-          <a:ln>
-            <a:tailEnd type="triangle"/>
-          </a:ln>
-        </p:spPr>
-        <p:style>
-          <a:lnRef idx="1">
-            <a:schemeClr val="accent1"/>
-          </a:lnRef>
-          <a:fillRef idx="0">
-            <a:schemeClr val="accent1"/>
-          </a:fillRef>
-          <a:effectRef idx="0">
-            <a:schemeClr val="accent1"/>
-          </a:effectRef>
-          <a:fontRef idx="minor">
-            <a:schemeClr val="tx1"/>
-          </a:fontRef>
-        </p:style>
-      </p:cxnSp>
       <p:sp>
         <p:nvSpPr>
           <p:cNvPr id="176" name="TextBox 175">
@@ -5051,8 +5198,8 @@
         </p:nvSpPr>
         <p:spPr>
           <a:xfrm>
-            <a:off x="2161564" y="5471049"/>
-            <a:ext cx="1386220" cy="461665"/>
+            <a:off x="4979276" y="6084248"/>
+            <a:ext cx="1386220" cy="430887"/>
           </a:xfrm>
           <a:prstGeom prst="rect">
             <a:avLst/>
@@ -5067,28 +5214,38 @@
           <a:p>
             <a:pPr algn="ctr"/>
             <a:r>
-              <a:rPr lang="en-US" sz="1200" dirty="0"/>
+              <a:rPr lang="en-US" sz="1100" dirty="0">
+                <a:latin typeface="Calibri" panose="020F0502020204030204" pitchFamily="34" charset="0"/>
+                <a:cs typeface="Calibri" panose="020F0502020204030204" pitchFamily="34" charset="0"/>
+              </a:rPr>
               <a:t>READ paths listed </a:t>
             </a:r>
           </a:p>
           <a:p>
             <a:pPr algn="ctr"/>
             <a:r>
-              <a:rPr lang="en-US" sz="1200" dirty="0"/>
+              <a:rPr lang="en-US" sz="1100" dirty="0">
+                <a:latin typeface="Calibri" panose="020F0502020204030204" pitchFamily="34" charset="0"/>
+                <a:cs typeface="Calibri" panose="020F0502020204030204" pitchFamily="34" charset="0"/>
+              </a:rPr>
               <a:t>in </a:t>
             </a:r>
             <a:r>
-              <a:rPr lang="en-US" sz="1200" b="1" dirty="0" err="1">
+              <a:rPr lang="en-US" sz="1100" b="1" dirty="0" err="1">
                 <a:solidFill>
                   <a:srgbClr val="FF0000"/>
                 </a:solidFill>
+                <a:latin typeface="Calibri" panose="020F0502020204030204" pitchFamily="34" charset="0"/>
+                <a:cs typeface="Calibri" panose="020F0502020204030204" pitchFamily="34" charset="0"/>
               </a:rPr>
               <a:t>vsspathlist.json</a:t>
             </a:r>
-            <a:endParaRPr lang="en-US" sz="1200" b="1" dirty="0">
+            <a:endParaRPr lang="en-US" sz="1100" b="1" dirty="0">
               <a:solidFill>
                 <a:srgbClr val="FF0000"/>
               </a:solidFill>
+              <a:latin typeface="Calibri" panose="020F0502020204030204" pitchFamily="34" charset="0"/>
+              <a:cs typeface="Calibri" panose="020F0502020204030204" pitchFamily="34" charset="0"/>
             </a:endParaRPr>
           </a:p>
         </p:txBody>
@@ -5107,8 +5264,8 @@
         </p:nvSpPr>
         <p:spPr>
           <a:xfrm>
-            <a:off x="10241320" y="3095009"/>
-            <a:ext cx="1109823" cy="383390"/>
+            <a:off x="9242414" y="3132082"/>
+            <a:ext cx="1053597" cy="383390"/>
           </a:xfrm>
           <a:prstGeom prst="roundRect">
             <a:avLst/>
@@ -5141,290 +5298,18 @@
           <a:p>
             <a:pPr algn="ctr"/>
             <a:r>
-              <a:rPr lang="en-US" sz="1400" b="1" dirty="0">
+              <a:rPr lang="en-US" sz="1200" b="1" dirty="0">
                 <a:solidFill>
                   <a:srgbClr val="C00000"/>
                 </a:solidFill>
-                <a:latin typeface="Centaur" panose="02030504050205020304" pitchFamily="18" charset="0"/>
+                <a:latin typeface="Calibri" panose="020F0502020204030204" pitchFamily="34" charset="0"/>
+                <a:cs typeface="Calibri" panose="020F0502020204030204" pitchFamily="34" charset="0"/>
               </a:rPr>
               <a:t>vissv2.binary</a:t>
             </a:r>
           </a:p>
         </p:txBody>
       </p:sp>
-      <p:sp>
-        <p:nvSpPr>
-          <p:cNvPr id="14" name="TextBox 13">
-            <a:extLst>
-              <a:ext uri="{FF2B5EF4-FFF2-40B4-BE49-F238E27FC236}">
-                <a16:creationId xmlns:a16="http://schemas.microsoft.com/office/drawing/2014/main" id="{2380C492-0B17-49B1-B36D-ED95C4318751}"/>
-              </a:ext>
-            </a:extLst>
-          </p:cNvPr>
-          <p:cNvSpPr txBox="1"/>
-          <p:nvPr/>
-        </p:nvSpPr>
-        <p:spPr>
-          <a:xfrm>
-            <a:off x="302680" y="2755287"/>
-            <a:ext cx="4668408" cy="830997"/>
-          </a:xfrm>
-          <a:prstGeom prst="rect">
-            <a:avLst/>
-          </a:prstGeom>
-          <a:noFill/>
-        </p:spPr>
-        <p:txBody>
-          <a:bodyPr wrap="square" rtlCol="0">
-            <a:spAutoFit/>
-          </a:bodyPr>
-          <a:lstStyle/>
-          <a:p>
-            <a:r>
-              <a:rPr lang="en-US" sz="1200" dirty="0"/>
-              <a:t>In theory, there will be two OVDS Server instances.</a:t>
-            </a:r>
-          </a:p>
-          <a:p>
-            <a:pPr marL="342900" indent="-342900">
-              <a:buFontTx/>
-              <a:buAutoNum type="arabicPeriod"/>
-            </a:pPr>
-            <a:r>
-              <a:rPr lang="en-US" sz="1200" b="1" dirty="0">
-                <a:solidFill>
-                  <a:srgbClr val="7030A0"/>
-                </a:solidFill>
-              </a:rPr>
-              <a:t>Cloud to Vehicle via </a:t>
-            </a:r>
-            <a:r>
-              <a:rPr lang="en-US" sz="1200" b="1" dirty="0" err="1">
-                <a:solidFill>
-                  <a:srgbClr val="7030A0"/>
-                </a:solidFill>
-              </a:rPr>
-              <a:t>LiveSim</a:t>
-            </a:r>
-            <a:r>
-              <a:rPr lang="en-US" sz="1200" b="1" dirty="0">
-                <a:solidFill>
-                  <a:srgbClr val="7030A0"/>
-                </a:solidFill>
-              </a:rPr>
-              <a:t>  (</a:t>
-            </a:r>
-            <a:r>
-              <a:rPr lang="en-US" sz="1200" b="1" i="0" dirty="0">
-                <a:solidFill>
-                  <a:srgbClr val="7030A0"/>
-                </a:solidFill>
-                <a:effectLst/>
-                <a:latin typeface="-apple-system"/>
-              </a:rPr>
-              <a:t>./</a:t>
-            </a:r>
-            <a:r>
-              <a:rPr lang="en-US" sz="1200" b="1" i="0" dirty="0" err="1">
-                <a:solidFill>
-                  <a:srgbClr val="7030A0"/>
-                </a:solidFill>
-                <a:effectLst/>
-                <a:latin typeface="-apple-system"/>
-              </a:rPr>
-              <a:t>ovds_server</a:t>
-            </a:r>
-            <a:r>
-              <a:rPr lang="en-US" sz="1200" b="1" i="0" dirty="0">
-                <a:solidFill>
-                  <a:srgbClr val="7030A0"/>
-                </a:solidFill>
-                <a:effectLst/>
-                <a:latin typeface="-apple-system"/>
-              </a:rPr>
-              <a:t> </a:t>
-            </a:r>
-            <a:r>
-              <a:rPr lang="en-US" sz="1200" b="1" i="0" dirty="0" err="1">
-                <a:solidFill>
-                  <a:srgbClr val="7030A0"/>
-                </a:solidFill>
-                <a:effectLst/>
-                <a:latin typeface="-apple-system"/>
-              </a:rPr>
-              <a:t>db</a:t>
-            </a:r>
-            <a:r>
-              <a:rPr lang="en-US" sz="1200" b="1" i="0" dirty="0">
-                <a:solidFill>
-                  <a:srgbClr val="7030A0"/>
-                </a:solidFill>
-                <a:effectLst/>
-                <a:latin typeface="-apple-system"/>
-              </a:rPr>
-              <a:t>-file-name </a:t>
-            </a:r>
-            <a:r>
-              <a:rPr lang="en-US" sz="1200" b="1" i="0" dirty="0" err="1">
-                <a:solidFill>
-                  <a:srgbClr val="7030A0"/>
-                </a:solidFill>
-                <a:effectLst/>
-                <a:latin typeface="-apple-system"/>
-              </a:rPr>
-              <a:t>livesim</a:t>
-            </a:r>
-            <a:r>
-              <a:rPr lang="en-US" sz="1200" b="1" dirty="0">
-                <a:solidFill>
-                  <a:srgbClr val="7030A0"/>
-                </a:solidFill>
-                <a:latin typeface="-apple-system"/>
-              </a:rPr>
-              <a:t>)</a:t>
-            </a:r>
-            <a:endParaRPr lang="en-US" sz="1200" b="1" dirty="0">
-              <a:solidFill>
-                <a:srgbClr val="7030A0"/>
-              </a:solidFill>
-            </a:endParaRPr>
-          </a:p>
-          <a:p>
-            <a:pPr marL="342900" indent="-342900">
-              <a:buFontTx/>
-              <a:buAutoNum type="arabicPeriod"/>
-            </a:pPr>
-            <a:r>
-              <a:rPr lang="en-US" sz="1200" b="1" dirty="0">
-                <a:solidFill>
-                  <a:schemeClr val="accent1">
-                    <a:lumMod val="50000"/>
-                  </a:schemeClr>
-                </a:solidFill>
-              </a:rPr>
-              <a:t>Vehicle to Cloud via OVDS client (</a:t>
-            </a:r>
-            <a:r>
-              <a:rPr lang="en-US" sz="1200" b="1" i="0" dirty="0">
-                <a:solidFill>
-                  <a:schemeClr val="accent1">
-                    <a:lumMod val="50000"/>
-                  </a:schemeClr>
-                </a:solidFill>
-                <a:effectLst/>
-                <a:latin typeface="-apple-system"/>
-              </a:rPr>
-              <a:t>./</a:t>
-            </a:r>
-            <a:r>
-              <a:rPr lang="en-US" sz="1200" b="1" i="0" dirty="0" err="1">
-                <a:solidFill>
-                  <a:schemeClr val="accent1">
-                    <a:lumMod val="50000"/>
-                  </a:schemeClr>
-                </a:solidFill>
-                <a:effectLst/>
-                <a:latin typeface="-apple-system"/>
-              </a:rPr>
-              <a:t>ovds_server</a:t>
-            </a:r>
-            <a:r>
-              <a:rPr lang="en-US" sz="1200" b="1" i="0" dirty="0">
-                <a:solidFill>
-                  <a:schemeClr val="accent1">
-                    <a:lumMod val="50000"/>
-                  </a:schemeClr>
-                </a:solidFill>
-                <a:effectLst/>
-                <a:latin typeface="-apple-system"/>
-              </a:rPr>
-              <a:t> </a:t>
-            </a:r>
-            <a:r>
-              <a:rPr lang="en-US" sz="1200" b="1" i="0" dirty="0" err="1">
-                <a:solidFill>
-                  <a:schemeClr val="accent1">
-                    <a:lumMod val="50000"/>
-                  </a:schemeClr>
-                </a:solidFill>
-                <a:effectLst/>
-                <a:latin typeface="-apple-system"/>
-              </a:rPr>
-              <a:t>db</a:t>
-            </a:r>
-            <a:r>
-              <a:rPr lang="en-US" sz="1200" b="1" i="0" dirty="0">
-                <a:solidFill>
-                  <a:schemeClr val="accent1">
-                    <a:lumMod val="50000"/>
-                  </a:schemeClr>
-                </a:solidFill>
-                <a:effectLst/>
-                <a:latin typeface="-apple-system"/>
-              </a:rPr>
-              <a:t>-file-name)</a:t>
-            </a:r>
-          </a:p>
-          <a:p>
-            <a:pPr algn="r"/>
-            <a:r>
-              <a:rPr lang="en-US" sz="1200" dirty="0">
-                <a:solidFill>
-                  <a:srgbClr val="FF0000"/>
-                </a:solidFill>
-              </a:rPr>
-              <a:t>One OVDS Server instance is used for simplicity.</a:t>
-            </a:r>
-            <a:endParaRPr lang="en-US" sz="1200" b="1" dirty="0">
-              <a:solidFill>
-                <a:srgbClr val="FF0000"/>
-              </a:solidFill>
-            </a:endParaRPr>
-          </a:p>
-        </p:txBody>
-      </p:sp>
-      <p:cxnSp>
-        <p:nvCxnSpPr>
-          <p:cNvPr id="18" name="Straight Arrow Connector 17">
-            <a:extLst>
-              <a:ext uri="{FF2B5EF4-FFF2-40B4-BE49-F238E27FC236}">
-                <a16:creationId xmlns:a16="http://schemas.microsoft.com/office/drawing/2014/main" id="{6038F7A0-05E7-4B6F-BD4C-5DB6D4E0EB47}"/>
-              </a:ext>
-            </a:extLst>
-          </p:cNvPr>
-          <p:cNvCxnSpPr>
-            <a:cxnSpLocks/>
-            <a:endCxn id="58" idx="0"/>
-          </p:cNvCxnSpPr>
-          <p:nvPr/>
-        </p:nvCxnSpPr>
-        <p:spPr>
-          <a:xfrm>
-            <a:off x="2225195" y="3603215"/>
-            <a:ext cx="241" cy="235969"/>
-          </a:xfrm>
-          <a:prstGeom prst="straightConnector1">
-            <a:avLst/>
-          </a:prstGeom>
-          <a:ln>
-            <a:tailEnd type="triangle"/>
-          </a:ln>
-        </p:spPr>
-        <p:style>
-          <a:lnRef idx="1">
-            <a:schemeClr val="accent1"/>
-          </a:lnRef>
-          <a:fillRef idx="0">
-            <a:schemeClr val="accent1"/>
-          </a:fillRef>
-          <a:effectRef idx="0">
-            <a:schemeClr val="accent1"/>
-          </a:effectRef>
-          <a:fontRef idx="minor">
-            <a:schemeClr val="tx1"/>
-          </a:fontRef>
-        </p:style>
-      </p:cxnSp>
       <p:sp>
         <p:nvSpPr>
           <p:cNvPr id="19" name="Title 18">
@@ -5449,17 +5334,23 @@
         </p:spPr>
         <p:txBody>
           <a:bodyPr>
-            <a:normAutofit fontScale="90000"/>
+            <a:normAutofit/>
           </a:bodyPr>
           <a:lstStyle/>
           <a:p>
             <a:pPr algn="ctr"/>
             <a:r>
-              <a:rPr lang="en-US"/>
+              <a:rPr lang="en-US" sz="3600">
+                <a:latin typeface="Calibri" panose="020F0502020204030204" pitchFamily="34" charset="0"/>
+                <a:cs typeface="Calibri" panose="020F0502020204030204" pitchFamily="34" charset="0"/>
+              </a:rPr>
               <a:t>CCS GitHub </a:t>
             </a:r>
             <a:r>
-              <a:rPr lang="en-US" dirty="0"/>
+              <a:rPr lang="en-US" sz="3600" dirty="0">
+                <a:latin typeface="Calibri" panose="020F0502020204030204" pitchFamily="34" charset="0"/>
+                <a:cs typeface="Calibri" panose="020F0502020204030204" pitchFamily="34" charset="0"/>
+              </a:rPr>
               <a:t>Deployment Model</a:t>
             </a:r>
           </a:p>
@@ -5483,8 +5374,8 @@
         </p:nvCxnSpPr>
         <p:spPr>
           <a:xfrm flipV="1">
-            <a:off x="9872429" y="3286704"/>
-            <a:ext cx="368891" cy="537"/>
+            <a:off x="8972700" y="3323777"/>
+            <a:ext cx="269714" cy="1"/>
           </a:xfrm>
           <a:prstGeom prst="straightConnector1">
             <a:avLst/>
@@ -5510,61 +5401,6 @@
       </p:cxnSp>
       <p:sp>
         <p:nvSpPr>
-          <p:cNvPr id="46" name="TextBox 45">
-            <a:extLst>
-              <a:ext uri="{FF2B5EF4-FFF2-40B4-BE49-F238E27FC236}">
-                <a16:creationId xmlns:a16="http://schemas.microsoft.com/office/drawing/2014/main" id="{AD3835F6-A040-4633-A8FB-4AC9BCE690FC}"/>
-              </a:ext>
-            </a:extLst>
-          </p:cNvPr>
-          <p:cNvSpPr txBox="1"/>
-          <p:nvPr/>
-        </p:nvSpPr>
-        <p:spPr>
-          <a:xfrm>
-            <a:off x="10237630" y="2642515"/>
-            <a:ext cx="1109823" cy="461665"/>
-          </a:xfrm>
-          <a:prstGeom prst="rect">
-            <a:avLst/>
-          </a:prstGeom>
-          <a:noFill/>
-        </p:spPr>
-        <p:txBody>
-          <a:bodyPr wrap="square">
-            <a:spAutoFit/>
-          </a:bodyPr>
-          <a:lstStyle/>
-          <a:p>
-            <a:r>
-              <a:rPr lang="en-US" sz="1200" b="1" dirty="0">
-                <a:solidFill>
-                  <a:srgbClr val="FF0000"/>
-                </a:solidFill>
-                <a:latin typeface="Centaur" panose="02030504050205020304" pitchFamily="18" charset="0"/>
-              </a:rPr>
-              <a:t>Generate </a:t>
-            </a:r>
-            <a:r>
-              <a:rPr lang="en-US" sz="1200" b="1" dirty="0" err="1">
-                <a:solidFill>
-                  <a:srgbClr val="FF0000"/>
-                </a:solidFill>
-                <a:latin typeface="Centaur" panose="02030504050205020304" pitchFamily="18" charset="0"/>
-              </a:rPr>
-              <a:t>vsspathlist.json</a:t>
-            </a:r>
-            <a:endParaRPr lang="en-US" sz="1200" b="1" dirty="0">
-              <a:solidFill>
-                <a:srgbClr val="FF0000"/>
-              </a:solidFill>
-              <a:latin typeface="Centaur" panose="02030504050205020304" pitchFamily="18" charset="0"/>
-            </a:endParaRPr>
-          </a:p>
-        </p:txBody>
-      </p:sp>
-      <p:sp>
-        <p:nvSpPr>
           <p:cNvPr id="47" name="CustomShape 45">
             <a:extLst>
               <a:ext uri="{FF2B5EF4-FFF2-40B4-BE49-F238E27FC236}">
@@ -5577,8 +5413,8 @@
         </p:nvSpPr>
         <p:spPr>
           <a:xfrm rot="15600">
-            <a:off x="5598834" y="5706119"/>
-            <a:ext cx="1016241" cy="531091"/>
+            <a:off x="5307361" y="5671441"/>
+            <a:ext cx="708970" cy="383551"/>
           </a:xfrm>
           <a:prstGeom prst="roundRect">
             <a:avLst>
@@ -5613,11 +5449,12 @@
           <a:p>
             <a:pPr algn="ctr"/>
             <a:r>
-              <a:rPr lang="en-CA" dirty="0">
+              <a:rPr lang="en-CA" sz="1100" dirty="0">
                 <a:solidFill>
                   <a:schemeClr val="lt1"/>
                 </a:solidFill>
-                <a:latin typeface="Centaur" panose="02030504050205020304" pitchFamily="18" charset="0"/>
+                <a:latin typeface="Calibri" panose="020F0502020204030204" pitchFamily="34" charset="0"/>
+                <a:cs typeface="Calibri" panose="020F0502020204030204" pitchFamily="34" charset="0"/>
               </a:rPr>
               <a:t>MQTT broker</a:t>
             </a:r>
@@ -5638,8 +5475,8 @@
         </p:nvSpPr>
         <p:spPr>
           <a:xfrm>
-            <a:off x="6689152" y="5684660"/>
-            <a:ext cx="546945" cy="369332"/>
+            <a:off x="6015145" y="5659704"/>
+            <a:ext cx="404278" cy="261610"/>
           </a:xfrm>
           <a:prstGeom prst="rect">
             <a:avLst/>
@@ -5653,7 +5490,10 @@
           <a:lstStyle/>
           <a:p>
             <a:r>
-              <a:rPr lang="en-US" dirty="0"/>
+              <a:rPr lang="en-US" sz="1100" dirty="0">
+                <a:latin typeface="Calibri" panose="020F0502020204030204" pitchFamily="34" charset="0"/>
+                <a:cs typeface="Calibri" panose="020F0502020204030204" pitchFamily="34" charset="0"/>
+              </a:rPr>
               <a:t>Pub</a:t>
             </a:r>
           </a:p>
@@ -5673,8 +5513,8 @@
         </p:nvSpPr>
         <p:spPr>
           <a:xfrm>
-            <a:off x="5039320" y="5640914"/>
-            <a:ext cx="534121" cy="369332"/>
+            <a:off x="4859115" y="5651448"/>
+            <a:ext cx="396262" cy="261610"/>
           </a:xfrm>
           <a:prstGeom prst="rect">
             <a:avLst/>
@@ -5688,7 +5528,10 @@
           <a:lstStyle/>
           <a:p>
             <a:r>
-              <a:rPr lang="en-US" dirty="0"/>
+              <a:rPr lang="en-US" sz="1100" dirty="0">
+                <a:latin typeface="Calibri" panose="020F0502020204030204" pitchFamily="34" charset="0"/>
+                <a:cs typeface="Calibri" panose="020F0502020204030204" pitchFamily="34" charset="0"/>
+              </a:rPr>
               <a:t>Sub</a:t>
             </a:r>
           </a:p>
@@ -5712,8 +5555,8 @@
         </p:nvCxnSpPr>
         <p:spPr>
           <a:xfrm flipH="1">
-            <a:off x="8122718" y="1973421"/>
-            <a:ext cx="429826" cy="1963"/>
+            <a:off x="7740767" y="2210241"/>
+            <a:ext cx="292638" cy="4418"/>
           </a:xfrm>
           <a:prstGeom prst="straightConnector1">
             <a:avLst/>
@@ -5742,29 +5585,34 @@
       </p:cxnSp>
       <p:cxnSp>
         <p:nvCxnSpPr>
-          <p:cNvPr id="107" name="Connector: Elbow 106">
-            <a:extLst>
-              <a:ext uri="{FF2B5EF4-FFF2-40B4-BE49-F238E27FC236}">
-                <a16:creationId xmlns:a16="http://schemas.microsoft.com/office/drawing/2014/main" id="{7F435F3F-5CEA-4214-9DCA-FEED7125A59D}"/>
+          <p:cNvPr id="159" name="Connector: Elbow 158">
+            <a:extLst>
+              <a:ext uri="{FF2B5EF4-FFF2-40B4-BE49-F238E27FC236}">
+                <a16:creationId xmlns:a16="http://schemas.microsoft.com/office/drawing/2014/main" id="{4D0EBDE9-DC10-4D33-BB55-0CD50E17ED32}"/>
               </a:ext>
             </a:extLst>
           </p:cNvPr>
           <p:cNvCxnSpPr>
             <a:cxnSpLocks/>
-            <a:stCxn id="8" idx="2"/>
-            <a:endCxn id="47" idx="3"/>
+            <a:stCxn id="85" idx="2"/>
+            <a:endCxn id="7" idx="2"/>
           </p:cNvCxnSpPr>
           <p:nvPr/>
         </p:nvCxnSpPr>
         <p:spPr>
-          <a:xfrm rot="5400000">
-            <a:off x="6888383" y="4936351"/>
-            <a:ext cx="764308" cy="1310933"/>
-          </a:xfrm>
-          <a:prstGeom prst="bentConnector2">
-            <a:avLst/>
+          <a:xfrm rot="5400000" flipH="1" flipV="1">
+            <a:off x="5354573" y="2889950"/>
+            <a:ext cx="1179850" cy="5139873"/>
+          </a:xfrm>
+          <a:prstGeom prst="bentConnector3">
+            <a:avLst>
+              <a:gd name="adj1" fmla="val -19375"/>
+            </a:avLst>
           </a:prstGeom>
           <a:ln>
+            <a:solidFill>
+              <a:srgbClr val="FF0000"/>
+            </a:solidFill>
             <a:tailEnd type="triangle"/>
           </a:ln>
         </p:spPr>
@@ -5785,29 +5633,34 @@
       </p:cxnSp>
       <p:cxnSp>
         <p:nvCxnSpPr>
-          <p:cNvPr id="110" name="Connector: Elbow 109">
-            <a:extLst>
-              <a:ext uri="{FF2B5EF4-FFF2-40B4-BE49-F238E27FC236}">
-                <a16:creationId xmlns:a16="http://schemas.microsoft.com/office/drawing/2014/main" id="{1BA1F12D-BF99-4959-97BD-6C57CBBE0E21}"/>
+          <p:cNvPr id="164" name="Connector: Elbow 163">
+            <a:extLst>
+              <a:ext uri="{FF2B5EF4-FFF2-40B4-BE49-F238E27FC236}">
+                <a16:creationId xmlns:a16="http://schemas.microsoft.com/office/drawing/2014/main" id="{0C2835CF-8B7C-45F3-A227-47993FDB25B2}"/>
               </a:ext>
             </a:extLst>
           </p:cNvPr>
           <p:cNvCxnSpPr>
             <a:cxnSpLocks/>
             <a:stCxn id="85" idx="2"/>
-            <a:endCxn id="47" idx="1"/>
+            <a:endCxn id="6" idx="2"/>
           </p:cNvCxnSpPr>
           <p:nvPr/>
         </p:nvCxnSpPr>
         <p:spPr>
-          <a:xfrm rot="16200000" flipH="1">
-            <a:off x="3554023" y="3924542"/>
-            <a:ext cx="715989" cy="3373644"/>
-          </a:xfrm>
-          <a:prstGeom prst="bentConnector2">
-            <a:avLst/>
+          <a:xfrm rot="5400000" flipH="1" flipV="1">
+            <a:off x="5801921" y="2426189"/>
+            <a:ext cx="1196264" cy="6050982"/>
+          </a:xfrm>
+          <a:prstGeom prst="bentConnector3">
+            <a:avLst>
+              <a:gd name="adj1" fmla="val -19109"/>
+            </a:avLst>
           </a:prstGeom>
           <a:ln>
+            <a:solidFill>
+              <a:srgbClr val="FF0000"/>
+            </a:solidFill>
             <a:tailEnd type="triangle"/>
           </a:ln>
         </p:spPr>
@@ -5826,105 +5679,826 @@
           </a:fontRef>
         </p:style>
       </p:cxnSp>
-      <p:grpSp>
-        <p:nvGrpSpPr>
-          <p:cNvPr id="28" name="Group 27">
-            <a:extLst>
-              <a:ext uri="{FF2B5EF4-FFF2-40B4-BE49-F238E27FC236}">
-                <a16:creationId xmlns:a16="http://schemas.microsoft.com/office/drawing/2014/main" id="{1A538DF7-BFE8-4694-B845-05FE231A1F7B}"/>
-              </a:ext>
-            </a:extLst>
-          </p:cNvPr>
-          <p:cNvGrpSpPr/>
+      <p:cxnSp>
+        <p:nvCxnSpPr>
+          <p:cNvPr id="149" name="Straight Arrow Connector 148">
+            <a:extLst>
+              <a:ext uri="{FF2B5EF4-FFF2-40B4-BE49-F238E27FC236}">
+                <a16:creationId xmlns:a16="http://schemas.microsoft.com/office/drawing/2014/main" id="{742E9C05-6448-4203-A57C-843E6FDAE1DF}"/>
+              </a:ext>
+            </a:extLst>
+          </p:cNvPr>
+          <p:cNvCxnSpPr>
+            <a:cxnSpLocks/>
+            <a:stCxn id="10" idx="3"/>
+            <a:endCxn id="5" idx="1"/>
+          </p:cNvCxnSpPr>
           <p:nvPr/>
-        </p:nvGrpSpPr>
-        <p:grpSpPr>
+        </p:nvCxnSpPr>
+        <p:spPr>
           <a:xfrm>
-            <a:off x="9872420" y="2221994"/>
-            <a:ext cx="361697" cy="873015"/>
-            <a:chOff x="9872420" y="2221994"/>
-            <a:chExt cx="361697" cy="873015"/>
-          </a:xfrm>
-        </p:grpSpPr>
-        <p:cxnSp>
-          <p:nvCxnSpPr>
-            <p:cNvPr id="99" name="Connector: Elbow 98">
-              <a:extLst>
-                <a:ext uri="{FF2B5EF4-FFF2-40B4-BE49-F238E27FC236}">
-                  <a16:creationId xmlns:a16="http://schemas.microsoft.com/office/drawing/2014/main" id="{E5E93B2C-9E96-4688-86E8-70677AEBF4B6}"/>
-                </a:ext>
-              </a:extLst>
-            </p:cNvPr>
-            <p:cNvCxnSpPr>
-              <a:cxnSpLocks/>
-              <a:endCxn id="5" idx="1"/>
-            </p:cNvCxnSpPr>
-            <p:nvPr/>
-          </p:nvCxnSpPr>
-          <p:spPr>
-            <a:xfrm rot="5400000" flipH="1" flipV="1">
-              <a:off x="9680958" y="2541851"/>
-              <a:ext cx="873015" cy="233302"/>
-            </a:xfrm>
-            <a:prstGeom prst="bentConnector2">
-              <a:avLst/>
-            </a:prstGeom>
-            <a:ln>
-              <a:tailEnd type="triangle"/>
-            </a:ln>
-          </p:spPr>
-          <p:style>
-            <a:lnRef idx="1">
+            <a:off x="8972701" y="2210241"/>
+            <a:ext cx="262645" cy="1507"/>
+          </a:xfrm>
+          <a:prstGeom prst="straightConnector1">
+            <a:avLst/>
+          </a:prstGeom>
+          <a:ln>
+            <a:solidFill>
               <a:schemeClr val="accent1"/>
-            </a:lnRef>
-            <a:fillRef idx="0">
+            </a:solidFill>
+            <a:tailEnd type="triangle"/>
+          </a:ln>
+        </p:spPr>
+        <p:style>
+          <a:lnRef idx="1">
+            <a:schemeClr val="accent1"/>
+          </a:lnRef>
+          <a:fillRef idx="0">
+            <a:schemeClr val="accent1"/>
+          </a:fillRef>
+          <a:effectRef idx="0">
+            <a:schemeClr val="accent1"/>
+          </a:effectRef>
+          <a:fontRef idx="minor">
+            <a:schemeClr val="tx1"/>
+          </a:fontRef>
+        </p:style>
+      </p:cxnSp>
+      <p:cxnSp>
+        <p:nvCxnSpPr>
+          <p:cNvPr id="152" name="Connector: Elbow 151">
+            <a:extLst>
+              <a:ext uri="{FF2B5EF4-FFF2-40B4-BE49-F238E27FC236}">
+                <a16:creationId xmlns:a16="http://schemas.microsoft.com/office/drawing/2014/main" id="{53FFDCDF-ACD3-4889-8AE4-9073ABCEEB1E}"/>
+              </a:ext>
+            </a:extLst>
+          </p:cNvPr>
+          <p:cNvCxnSpPr>
+            <a:cxnSpLocks/>
+            <a:stCxn id="10" idx="3"/>
+            <a:endCxn id="4" idx="1"/>
+          </p:cNvCxnSpPr>
+          <p:nvPr/>
+        </p:nvCxnSpPr>
+        <p:spPr>
+          <a:xfrm flipV="1">
+            <a:off x="8972701" y="1711448"/>
+            <a:ext cx="262646" cy="498793"/>
+          </a:xfrm>
+          <a:prstGeom prst="bentConnector3">
+            <a:avLst>
+              <a:gd name="adj1" fmla="val 50000"/>
+            </a:avLst>
+          </a:prstGeom>
+          <a:ln>
+            <a:solidFill>
               <a:schemeClr val="accent1"/>
-            </a:fillRef>
-            <a:effectRef idx="0">
-              <a:schemeClr val="accent1"/>
-            </a:effectRef>
-            <a:fontRef idx="minor">
-              <a:schemeClr val="tx1"/>
-            </a:fontRef>
-          </p:style>
-        </p:cxnSp>
-        <p:cxnSp>
-          <p:nvCxnSpPr>
-            <p:cNvPr id="24" name="Straight Connector 23">
-              <a:extLst>
-                <a:ext uri="{FF2B5EF4-FFF2-40B4-BE49-F238E27FC236}">
-                  <a16:creationId xmlns:a16="http://schemas.microsoft.com/office/drawing/2014/main" id="{58BE040F-B7E1-40BA-8776-7D8360959930}"/>
-                </a:ext>
-              </a:extLst>
-            </p:cNvPr>
-            <p:cNvCxnSpPr/>
-            <p:nvPr/>
-          </p:nvCxnSpPr>
-          <p:spPr>
-            <a:xfrm flipH="1">
-              <a:off x="9872420" y="3095009"/>
-              <a:ext cx="128392" cy="0"/>
-            </a:xfrm>
-            <a:prstGeom prst="line">
-              <a:avLst/>
-            </a:prstGeom>
-          </p:spPr>
-          <p:style>
-            <a:lnRef idx="1">
-              <a:schemeClr val="accent1"/>
-            </a:lnRef>
-            <a:fillRef idx="0">
-              <a:schemeClr val="accent1"/>
-            </a:fillRef>
-            <a:effectRef idx="0">
-              <a:schemeClr val="accent1"/>
-            </a:effectRef>
-            <a:fontRef idx="minor">
-              <a:schemeClr val="tx1"/>
-            </a:fontRef>
-          </p:style>
-        </p:cxnSp>
-      </p:grpSp>
+            </a:solidFill>
+            <a:tailEnd type="triangle"/>
+          </a:ln>
+        </p:spPr>
+        <p:style>
+          <a:lnRef idx="1">
+            <a:schemeClr val="accent1"/>
+          </a:lnRef>
+          <a:fillRef idx="0">
+            <a:schemeClr val="accent1"/>
+          </a:fillRef>
+          <a:effectRef idx="0">
+            <a:schemeClr val="accent1"/>
+          </a:effectRef>
+          <a:fontRef idx="minor">
+            <a:schemeClr val="tx1"/>
+          </a:fontRef>
+        </p:style>
+      </p:cxnSp>
+      <p:sp>
+        <p:nvSpPr>
+          <p:cNvPr id="200" name="Rectangle: Rounded Corners 199">
+            <a:extLst>
+              <a:ext uri="{FF2B5EF4-FFF2-40B4-BE49-F238E27FC236}">
+                <a16:creationId xmlns:a16="http://schemas.microsoft.com/office/drawing/2014/main" id="{C8BCC44E-31DD-43F4-ADA0-8FF2861BCB38}"/>
+              </a:ext>
+            </a:extLst>
+          </p:cNvPr>
+          <p:cNvSpPr/>
+          <p:nvPr/>
+        </p:nvSpPr>
+        <p:spPr>
+          <a:xfrm>
+            <a:off x="1786538" y="2020816"/>
+            <a:ext cx="662091" cy="385161"/>
+          </a:xfrm>
+          <a:prstGeom prst="roundRect">
+            <a:avLst/>
+          </a:prstGeom>
+          <a:solidFill>
+            <a:schemeClr val="accent1">
+              <a:lumMod val="50000"/>
+            </a:schemeClr>
+          </a:solidFill>
+        </p:spPr>
+        <p:style>
+          <a:lnRef idx="2">
+            <a:schemeClr val="accent1">
+              <a:shade val="50000"/>
+            </a:schemeClr>
+          </a:lnRef>
+          <a:fillRef idx="1">
+            <a:schemeClr val="accent1"/>
+          </a:fillRef>
+          <a:effectRef idx="0">
+            <a:schemeClr val="accent1"/>
+          </a:effectRef>
+          <a:fontRef idx="minor">
+            <a:schemeClr val="lt1"/>
+          </a:fontRef>
+        </p:style>
+        <p:txBody>
+          <a:bodyPr rtlCol="0" anchor="ctr"/>
+          <a:lstStyle/>
+          <a:p>
+            <a:pPr algn="ctr"/>
+            <a:r>
+              <a:rPr lang="en-US" sz="1100" dirty="0">
+                <a:latin typeface="Calibri" panose="020F0502020204030204" pitchFamily="34" charset="0"/>
+                <a:cs typeface="Calibri" panose="020F0502020204030204" pitchFamily="34" charset="0"/>
+              </a:rPr>
+              <a:t>OVDS Server</a:t>
+            </a:r>
+          </a:p>
+        </p:txBody>
+      </p:sp>
+      <p:sp>
+        <p:nvSpPr>
+          <p:cNvPr id="202" name="TextBox 201">
+            <a:extLst>
+              <a:ext uri="{FF2B5EF4-FFF2-40B4-BE49-F238E27FC236}">
+                <a16:creationId xmlns:a16="http://schemas.microsoft.com/office/drawing/2014/main" id="{849E73F0-11EF-47FA-B085-BAE15F55729C}"/>
+              </a:ext>
+            </a:extLst>
+          </p:cNvPr>
+          <p:cNvSpPr txBox="1"/>
+          <p:nvPr/>
+        </p:nvSpPr>
+        <p:spPr>
+          <a:xfrm>
+            <a:off x="5113200" y="1766944"/>
+            <a:ext cx="1282723" cy="430887"/>
+          </a:xfrm>
+          <a:prstGeom prst="rect">
+            <a:avLst/>
+          </a:prstGeom>
+          <a:noFill/>
+        </p:spPr>
+        <p:txBody>
+          <a:bodyPr wrap="none" rtlCol="0">
+            <a:spAutoFit/>
+          </a:bodyPr>
+          <a:lstStyle/>
+          <a:p>
+            <a:r>
+              <a:rPr lang="en-US" sz="1100" dirty="0">
+                <a:latin typeface="Calibri" panose="020F0502020204030204" pitchFamily="34" charset="0"/>
+                <a:cs typeface="Calibri" panose="020F0502020204030204" pitchFamily="34" charset="0"/>
+              </a:rPr>
+              <a:t>WRITE  Periodically</a:t>
+            </a:r>
+          </a:p>
+          <a:p>
+            <a:r>
+              <a:rPr lang="en-US" sz="1100" dirty="0">
+                <a:latin typeface="Calibri" panose="020F0502020204030204" pitchFamily="34" charset="0"/>
+                <a:cs typeface="Calibri" panose="020F0502020204030204" pitchFamily="34" charset="0"/>
+              </a:rPr>
+              <a:t>(Timestamp based)</a:t>
+            </a:r>
+          </a:p>
+        </p:txBody>
+      </p:sp>
+      <p:sp>
+        <p:nvSpPr>
+          <p:cNvPr id="203" name="Flowchart: Magnetic Disk 202">
+            <a:extLst>
+              <a:ext uri="{FF2B5EF4-FFF2-40B4-BE49-F238E27FC236}">
+                <a16:creationId xmlns:a16="http://schemas.microsoft.com/office/drawing/2014/main" id="{57DA711E-76EE-4E6D-A406-83D756BA9CEE}"/>
+              </a:ext>
+            </a:extLst>
+          </p:cNvPr>
+          <p:cNvSpPr/>
+          <p:nvPr/>
+        </p:nvSpPr>
+        <p:spPr>
+          <a:xfrm>
+            <a:off x="860375" y="2020816"/>
+            <a:ext cx="652680" cy="391187"/>
+          </a:xfrm>
+          <a:prstGeom prst="flowChartMagneticDisk">
+            <a:avLst/>
+          </a:prstGeom>
+          <a:solidFill>
+            <a:schemeClr val="accent1">
+              <a:lumMod val="50000"/>
+            </a:schemeClr>
+          </a:solidFill>
+        </p:spPr>
+        <p:style>
+          <a:lnRef idx="2">
+            <a:schemeClr val="accent1">
+              <a:shade val="50000"/>
+            </a:schemeClr>
+          </a:lnRef>
+          <a:fillRef idx="1">
+            <a:schemeClr val="accent1"/>
+          </a:fillRef>
+          <a:effectRef idx="0">
+            <a:schemeClr val="accent1"/>
+          </a:effectRef>
+          <a:fontRef idx="minor">
+            <a:schemeClr val="lt1"/>
+          </a:fontRef>
+        </p:style>
+        <p:txBody>
+          <a:bodyPr rtlCol="0" anchor="ctr"/>
+          <a:lstStyle/>
+          <a:p>
+            <a:pPr algn="ctr"/>
+            <a:r>
+              <a:rPr lang="en-US" sz="1200" dirty="0">
+                <a:latin typeface="Calibri" panose="020F0502020204030204" pitchFamily="34" charset="0"/>
+                <a:cs typeface="Calibri" panose="020F0502020204030204" pitchFamily="34" charset="0"/>
+              </a:rPr>
+              <a:t>OVDS</a:t>
+            </a:r>
+          </a:p>
+        </p:txBody>
+      </p:sp>
+      <p:cxnSp>
+        <p:nvCxnSpPr>
+          <p:cNvPr id="206" name="Straight Arrow Connector 205">
+            <a:extLst>
+              <a:ext uri="{FF2B5EF4-FFF2-40B4-BE49-F238E27FC236}">
+                <a16:creationId xmlns:a16="http://schemas.microsoft.com/office/drawing/2014/main" id="{2B9A7F61-882A-4D6E-82E3-01BBB1D0CB9F}"/>
+              </a:ext>
+            </a:extLst>
+          </p:cNvPr>
+          <p:cNvCxnSpPr>
+            <a:cxnSpLocks/>
+            <a:stCxn id="200" idx="1"/>
+            <a:endCxn id="203" idx="4"/>
+          </p:cNvCxnSpPr>
+          <p:nvPr/>
+        </p:nvCxnSpPr>
+        <p:spPr>
+          <a:xfrm flipH="1">
+            <a:off x="1513055" y="2213397"/>
+            <a:ext cx="273483" cy="3013"/>
+          </a:xfrm>
+          <a:prstGeom prst="straightConnector1">
+            <a:avLst/>
+          </a:prstGeom>
+          <a:ln>
+            <a:headEnd type="triangle"/>
+            <a:tailEnd type="triangle"/>
+          </a:ln>
+        </p:spPr>
+        <p:style>
+          <a:lnRef idx="1">
+            <a:schemeClr val="accent1"/>
+          </a:lnRef>
+          <a:fillRef idx="0">
+            <a:schemeClr val="accent1"/>
+          </a:fillRef>
+          <a:effectRef idx="0">
+            <a:schemeClr val="accent1"/>
+          </a:effectRef>
+          <a:fontRef idx="minor">
+            <a:schemeClr val="tx1"/>
+          </a:fontRef>
+        </p:style>
+      </p:cxnSp>
+      <p:cxnSp>
+        <p:nvCxnSpPr>
+          <p:cNvPr id="207" name="Straight Arrow Connector 206">
+            <a:extLst>
+              <a:ext uri="{FF2B5EF4-FFF2-40B4-BE49-F238E27FC236}">
+                <a16:creationId xmlns:a16="http://schemas.microsoft.com/office/drawing/2014/main" id="{335A8D77-B32F-453A-BBF9-D800A5C82E37}"/>
+              </a:ext>
+            </a:extLst>
+          </p:cNvPr>
+          <p:cNvCxnSpPr>
+            <a:cxnSpLocks/>
+            <a:stCxn id="200" idx="3"/>
+            <a:endCxn id="60" idx="1"/>
+          </p:cNvCxnSpPr>
+          <p:nvPr/>
+        </p:nvCxnSpPr>
+        <p:spPr>
+          <a:xfrm>
+            <a:off x="2448629" y="2213397"/>
+            <a:ext cx="634309" cy="0"/>
+          </a:xfrm>
+          <a:prstGeom prst="straightConnector1">
+            <a:avLst/>
+          </a:prstGeom>
+          <a:ln>
+            <a:tailEnd type="triangle"/>
+          </a:ln>
+        </p:spPr>
+        <p:style>
+          <a:lnRef idx="1">
+            <a:schemeClr val="accent1"/>
+          </a:lnRef>
+          <a:fillRef idx="0">
+            <a:schemeClr val="accent1"/>
+          </a:fillRef>
+          <a:effectRef idx="0">
+            <a:schemeClr val="accent1"/>
+          </a:effectRef>
+          <a:fontRef idx="minor">
+            <a:schemeClr val="tx1"/>
+          </a:fontRef>
+        </p:style>
+      </p:cxnSp>
+      <p:cxnSp>
+        <p:nvCxnSpPr>
+          <p:cNvPr id="212" name="Straight Arrow Connector 211">
+            <a:extLst>
+              <a:ext uri="{FF2B5EF4-FFF2-40B4-BE49-F238E27FC236}">
+                <a16:creationId xmlns:a16="http://schemas.microsoft.com/office/drawing/2014/main" id="{E28EF56B-720C-46AB-9FBB-8054D860B9D4}"/>
+              </a:ext>
+            </a:extLst>
+          </p:cNvPr>
+          <p:cNvCxnSpPr>
+            <a:cxnSpLocks/>
+            <a:stCxn id="60" idx="3"/>
+            <a:endCxn id="11" idx="2"/>
+          </p:cNvCxnSpPr>
+          <p:nvPr/>
+        </p:nvCxnSpPr>
+        <p:spPr>
+          <a:xfrm>
+            <a:off x="3582507" y="2213397"/>
+            <a:ext cx="3286255" cy="1262"/>
+          </a:xfrm>
+          <a:prstGeom prst="straightConnector1">
+            <a:avLst/>
+          </a:prstGeom>
+          <a:ln>
+            <a:solidFill>
+              <a:srgbClr val="C00000"/>
+            </a:solidFill>
+            <a:tailEnd type="triangle"/>
+          </a:ln>
+        </p:spPr>
+        <p:style>
+          <a:lnRef idx="1">
+            <a:schemeClr val="accent1"/>
+          </a:lnRef>
+          <a:fillRef idx="0">
+            <a:schemeClr val="accent1"/>
+          </a:fillRef>
+          <a:effectRef idx="0">
+            <a:schemeClr val="accent1"/>
+          </a:effectRef>
+          <a:fontRef idx="minor">
+            <a:schemeClr val="tx1"/>
+          </a:fontRef>
+        </p:style>
+      </p:cxnSp>
+      <p:cxnSp>
+        <p:nvCxnSpPr>
+          <p:cNvPr id="234" name="Straight Arrow Connector 233">
+            <a:extLst>
+              <a:ext uri="{FF2B5EF4-FFF2-40B4-BE49-F238E27FC236}">
+                <a16:creationId xmlns:a16="http://schemas.microsoft.com/office/drawing/2014/main" id="{839D6E61-2B65-441A-8A1A-B3831DDE2C00}"/>
+              </a:ext>
+            </a:extLst>
+          </p:cNvPr>
+          <p:cNvCxnSpPr>
+            <a:cxnSpLocks/>
+            <a:stCxn id="85" idx="3"/>
+            <a:endCxn id="47" idx="1"/>
+          </p:cNvCxnSpPr>
+          <p:nvPr/>
+        </p:nvCxnSpPr>
+        <p:spPr>
+          <a:xfrm>
+            <a:off x="3705607" y="5857232"/>
+            <a:ext cx="1601758" cy="4376"/>
+          </a:xfrm>
+          <a:prstGeom prst="straightConnector1">
+            <a:avLst/>
+          </a:prstGeom>
+          <a:ln>
+            <a:solidFill>
+              <a:srgbClr val="FF0000"/>
+            </a:solidFill>
+            <a:tailEnd type="triangle"/>
+          </a:ln>
+        </p:spPr>
+        <p:style>
+          <a:lnRef idx="1">
+            <a:schemeClr val="accent1"/>
+          </a:lnRef>
+          <a:fillRef idx="0">
+            <a:schemeClr val="accent1"/>
+          </a:fillRef>
+          <a:effectRef idx="0">
+            <a:schemeClr val="accent1"/>
+          </a:effectRef>
+          <a:fontRef idx="minor">
+            <a:schemeClr val="tx1"/>
+          </a:fontRef>
+        </p:style>
+      </p:cxnSp>
+      <p:cxnSp>
+        <p:nvCxnSpPr>
+          <p:cNvPr id="237" name="Connector: Elbow 236">
+            <a:extLst>
+              <a:ext uri="{FF2B5EF4-FFF2-40B4-BE49-F238E27FC236}">
+                <a16:creationId xmlns:a16="http://schemas.microsoft.com/office/drawing/2014/main" id="{7CF8A035-45EC-4681-A305-FD804F3B93C3}"/>
+              </a:ext>
+            </a:extLst>
+          </p:cNvPr>
+          <p:cNvCxnSpPr>
+            <a:cxnSpLocks/>
+            <a:stCxn id="47" idx="3"/>
+            <a:endCxn id="8" idx="2"/>
+          </p:cNvCxnSpPr>
+          <p:nvPr/>
+        </p:nvCxnSpPr>
+        <p:spPr>
+          <a:xfrm flipV="1">
+            <a:off x="6016327" y="4868881"/>
+            <a:ext cx="1639599" cy="995945"/>
+          </a:xfrm>
+          <a:prstGeom prst="bentConnector2">
+            <a:avLst/>
+          </a:prstGeom>
+          <a:ln>
+            <a:solidFill>
+              <a:srgbClr val="FF0000"/>
+            </a:solidFill>
+            <a:headEnd type="triangle"/>
+            <a:tailEnd type="none"/>
+          </a:ln>
+        </p:spPr>
+        <p:style>
+          <a:lnRef idx="1">
+            <a:schemeClr val="accent1"/>
+          </a:lnRef>
+          <a:fillRef idx="0">
+            <a:schemeClr val="accent1"/>
+          </a:fillRef>
+          <a:effectRef idx="0">
+            <a:schemeClr val="accent1"/>
+          </a:effectRef>
+          <a:fontRef idx="minor">
+            <a:schemeClr val="tx1"/>
+          </a:fontRef>
+        </p:style>
+      </p:cxnSp>
+      <p:sp>
+        <p:nvSpPr>
+          <p:cNvPr id="254" name="TextBox 253">
+            <a:extLst>
+              <a:ext uri="{FF2B5EF4-FFF2-40B4-BE49-F238E27FC236}">
+                <a16:creationId xmlns:a16="http://schemas.microsoft.com/office/drawing/2014/main" id="{32CA25FD-A4DC-48C6-A131-88C131157A8B}"/>
+              </a:ext>
+            </a:extLst>
+          </p:cNvPr>
+          <p:cNvSpPr txBox="1"/>
+          <p:nvPr/>
+        </p:nvSpPr>
+        <p:spPr>
+          <a:xfrm>
+            <a:off x="9159290" y="3455845"/>
+            <a:ext cx="1250926" cy="430887"/>
+          </a:xfrm>
+          <a:prstGeom prst="rect">
+            <a:avLst/>
+          </a:prstGeom>
+          <a:noFill/>
+        </p:spPr>
+        <p:txBody>
+          <a:bodyPr wrap="square">
+            <a:spAutoFit/>
+          </a:bodyPr>
+          <a:lstStyle/>
+          <a:p>
+            <a:pPr algn="ctr"/>
+            <a:r>
+              <a:rPr lang="en-US" sz="1100" b="1" dirty="0">
+                <a:solidFill>
+                  <a:srgbClr val="FF0000"/>
+                </a:solidFill>
+                <a:latin typeface="Calibri" panose="020F0502020204030204" pitchFamily="34" charset="0"/>
+                <a:cs typeface="Calibri" panose="020F0502020204030204" pitchFamily="34" charset="0"/>
+              </a:rPr>
+              <a:t>Generates </a:t>
+            </a:r>
+          </a:p>
+          <a:p>
+            <a:pPr algn="ctr"/>
+            <a:r>
+              <a:rPr lang="en-US" sz="1100" b="1" dirty="0" err="1">
+                <a:solidFill>
+                  <a:srgbClr val="FF0000"/>
+                </a:solidFill>
+                <a:latin typeface="Calibri" panose="020F0502020204030204" pitchFamily="34" charset="0"/>
+                <a:cs typeface="Calibri" panose="020F0502020204030204" pitchFamily="34" charset="0"/>
+              </a:rPr>
+              <a:t>vsspathlist.json</a:t>
+            </a:r>
+            <a:endParaRPr lang="en-US" sz="1100" b="1" dirty="0">
+              <a:solidFill>
+                <a:srgbClr val="FF0000"/>
+              </a:solidFill>
+              <a:latin typeface="Calibri" panose="020F0502020204030204" pitchFamily="34" charset="0"/>
+              <a:cs typeface="Calibri" panose="020F0502020204030204" pitchFamily="34" charset="0"/>
+            </a:endParaRPr>
+          </a:p>
+        </p:txBody>
+      </p:sp>
+      <p:sp>
+        <p:nvSpPr>
+          <p:cNvPr id="256" name="Rectangle: Rounded Corners 255">
+            <a:extLst>
+              <a:ext uri="{FF2B5EF4-FFF2-40B4-BE49-F238E27FC236}">
+                <a16:creationId xmlns:a16="http://schemas.microsoft.com/office/drawing/2014/main" id="{810C334C-E7C9-4B63-9C24-85E7BF5708D4}"/>
+              </a:ext>
+            </a:extLst>
+          </p:cNvPr>
+          <p:cNvSpPr/>
+          <p:nvPr/>
+        </p:nvSpPr>
+        <p:spPr>
+          <a:xfrm>
+            <a:off x="10320214" y="6064924"/>
+            <a:ext cx="372520" cy="247651"/>
+          </a:xfrm>
+          <a:prstGeom prst="roundRect">
+            <a:avLst/>
+          </a:prstGeom>
+          <a:solidFill>
+            <a:schemeClr val="accent4">
+              <a:lumMod val="20000"/>
+              <a:lumOff val="80000"/>
+              <a:alpha val="90000"/>
+            </a:schemeClr>
+          </a:solidFill>
+        </p:spPr>
+        <p:style>
+          <a:lnRef idx="2">
+            <a:schemeClr val="accent1">
+              <a:shade val="50000"/>
+            </a:schemeClr>
+          </a:lnRef>
+          <a:fillRef idx="1">
+            <a:schemeClr val="accent1"/>
+          </a:fillRef>
+          <a:effectRef idx="0">
+            <a:schemeClr val="accent1"/>
+          </a:effectRef>
+          <a:fontRef idx="minor">
+            <a:schemeClr val="lt1"/>
+          </a:fontRef>
+        </p:style>
+        <p:txBody>
+          <a:bodyPr rtlCol="0" anchor="ctr"/>
+          <a:lstStyle/>
+          <a:p>
+            <a:pPr algn="ctr"/>
+            <a:endParaRPr lang="en-US" sz="1600" dirty="0">
+              <a:solidFill>
+                <a:schemeClr val="bg1"/>
+              </a:solidFill>
+              <a:latin typeface="Calibri" panose="020F0502020204030204" pitchFamily="34" charset="0"/>
+              <a:cs typeface="Calibri" panose="020F0502020204030204" pitchFamily="34" charset="0"/>
+            </a:endParaRPr>
+          </a:p>
+        </p:txBody>
+      </p:sp>
+      <p:sp>
+        <p:nvSpPr>
+          <p:cNvPr id="257" name="Rectangle: Rounded Corners 256">
+            <a:extLst>
+              <a:ext uri="{FF2B5EF4-FFF2-40B4-BE49-F238E27FC236}">
+                <a16:creationId xmlns:a16="http://schemas.microsoft.com/office/drawing/2014/main" id="{5BA891B8-ACE6-4348-B4CA-0622C61AD1EA}"/>
+              </a:ext>
+            </a:extLst>
+          </p:cNvPr>
+          <p:cNvSpPr/>
+          <p:nvPr/>
+        </p:nvSpPr>
+        <p:spPr>
+          <a:xfrm>
+            <a:off x="10325803" y="6412381"/>
+            <a:ext cx="354269" cy="243094"/>
+          </a:xfrm>
+          <a:prstGeom prst="roundRect">
+            <a:avLst/>
+          </a:prstGeom>
+          <a:solidFill>
+            <a:srgbClr val="E8B3F3">
+              <a:alpha val="28000"/>
+            </a:srgbClr>
+          </a:solidFill>
+        </p:spPr>
+        <p:style>
+          <a:lnRef idx="2">
+            <a:schemeClr val="accent1">
+              <a:shade val="50000"/>
+            </a:schemeClr>
+          </a:lnRef>
+          <a:fillRef idx="1">
+            <a:schemeClr val="accent1"/>
+          </a:fillRef>
+          <a:effectRef idx="0">
+            <a:schemeClr val="accent1"/>
+          </a:effectRef>
+          <a:fontRef idx="minor">
+            <a:schemeClr val="lt1"/>
+          </a:fontRef>
+        </p:style>
+        <p:txBody>
+          <a:bodyPr rtlCol="0" anchor="t"/>
+          <a:lstStyle/>
+          <a:p>
+            <a:pPr algn="ctr"/>
+            <a:endParaRPr lang="en-US" sz="1400" dirty="0">
+              <a:solidFill>
+                <a:schemeClr val="tx1"/>
+              </a:solidFill>
+              <a:latin typeface="Calibri" panose="020F0502020204030204" pitchFamily="34" charset="0"/>
+              <a:cs typeface="Calibri" panose="020F0502020204030204" pitchFamily="34" charset="0"/>
+            </a:endParaRPr>
+          </a:p>
+        </p:txBody>
+      </p:sp>
+      <p:sp>
+        <p:nvSpPr>
+          <p:cNvPr id="258" name="Rectangle: Rounded Corners 257">
+            <a:extLst>
+              <a:ext uri="{FF2B5EF4-FFF2-40B4-BE49-F238E27FC236}">
+                <a16:creationId xmlns:a16="http://schemas.microsoft.com/office/drawing/2014/main" id="{849612AE-CE5A-4917-B4B5-EAF6B6DAF15F}"/>
+              </a:ext>
+            </a:extLst>
+          </p:cNvPr>
+          <p:cNvSpPr/>
+          <p:nvPr/>
+        </p:nvSpPr>
+        <p:spPr>
+          <a:xfrm>
+            <a:off x="10325803" y="5706481"/>
+            <a:ext cx="354269" cy="243094"/>
+          </a:xfrm>
+          <a:prstGeom prst="roundRect">
+            <a:avLst/>
+          </a:prstGeom>
+          <a:solidFill>
+            <a:schemeClr val="accent1">
+              <a:lumMod val="40000"/>
+              <a:lumOff val="60000"/>
+              <a:alpha val="38000"/>
+            </a:schemeClr>
+          </a:solidFill>
+        </p:spPr>
+        <p:style>
+          <a:lnRef idx="2">
+            <a:schemeClr val="accent1">
+              <a:shade val="50000"/>
+            </a:schemeClr>
+          </a:lnRef>
+          <a:fillRef idx="1">
+            <a:schemeClr val="accent1"/>
+          </a:fillRef>
+          <a:effectRef idx="0">
+            <a:schemeClr val="accent1"/>
+          </a:effectRef>
+          <a:fontRef idx="minor">
+            <a:schemeClr val="lt1"/>
+          </a:fontRef>
+        </p:style>
+        <p:txBody>
+          <a:bodyPr rtlCol="0" anchor="t"/>
+          <a:lstStyle/>
+          <a:p>
+            <a:pPr algn="ctr"/>
+            <a:endParaRPr lang="en-US" sz="1400" dirty="0">
+              <a:latin typeface="Calibri" panose="020F0502020204030204" pitchFamily="34" charset="0"/>
+              <a:cs typeface="Calibri" panose="020F0502020204030204" pitchFamily="34" charset="0"/>
+            </a:endParaRPr>
+          </a:p>
+        </p:txBody>
+      </p:sp>
+      <p:sp>
+        <p:nvSpPr>
+          <p:cNvPr id="253" name="TextBox 252">
+            <a:extLst>
+              <a:ext uri="{FF2B5EF4-FFF2-40B4-BE49-F238E27FC236}">
+                <a16:creationId xmlns:a16="http://schemas.microsoft.com/office/drawing/2014/main" id="{1BB3221F-C78A-4C5E-9B3E-C5C25FE85458}"/>
+              </a:ext>
+            </a:extLst>
+          </p:cNvPr>
+          <p:cNvSpPr txBox="1"/>
+          <p:nvPr/>
+        </p:nvSpPr>
+        <p:spPr>
+          <a:xfrm>
+            <a:off x="10845322" y="5636012"/>
+            <a:ext cx="726481" cy="369332"/>
+          </a:xfrm>
+          <a:prstGeom prst="rect">
+            <a:avLst/>
+          </a:prstGeom>
+          <a:noFill/>
+        </p:spPr>
+        <p:txBody>
+          <a:bodyPr wrap="none" rtlCol="0">
+            <a:spAutoFit/>
+          </a:bodyPr>
+          <a:lstStyle/>
+          <a:p>
+            <a:r>
+              <a:rPr lang="en-US" dirty="0"/>
+              <a:t>Cloud</a:t>
+            </a:r>
+          </a:p>
+        </p:txBody>
+      </p:sp>
+      <p:sp>
+        <p:nvSpPr>
+          <p:cNvPr id="260" name="TextBox 259">
+            <a:extLst>
+              <a:ext uri="{FF2B5EF4-FFF2-40B4-BE49-F238E27FC236}">
+                <a16:creationId xmlns:a16="http://schemas.microsoft.com/office/drawing/2014/main" id="{4C707D77-1BD5-4670-B666-C200F5C303FD}"/>
+              </a:ext>
+            </a:extLst>
+          </p:cNvPr>
+          <p:cNvSpPr txBox="1"/>
+          <p:nvPr/>
+        </p:nvSpPr>
+        <p:spPr>
+          <a:xfrm>
+            <a:off x="10829166" y="6004083"/>
+            <a:ext cx="860877" cy="369332"/>
+          </a:xfrm>
+          <a:prstGeom prst="rect">
+            <a:avLst/>
+          </a:prstGeom>
+          <a:noFill/>
+        </p:spPr>
+        <p:txBody>
+          <a:bodyPr wrap="none" rtlCol="0">
+            <a:spAutoFit/>
+          </a:bodyPr>
+          <a:lstStyle/>
+          <a:p>
+            <a:r>
+              <a:rPr lang="en-US" dirty="0"/>
+              <a:t>Vehicle</a:t>
+            </a:r>
+          </a:p>
+        </p:txBody>
+      </p:sp>
+      <p:sp>
+        <p:nvSpPr>
+          <p:cNvPr id="261" name="TextBox 260">
+            <a:extLst>
+              <a:ext uri="{FF2B5EF4-FFF2-40B4-BE49-F238E27FC236}">
+                <a16:creationId xmlns:a16="http://schemas.microsoft.com/office/drawing/2014/main" id="{9EAC4F91-1FB1-40CC-97B1-8C5E59A81BB0}"/>
+              </a:ext>
+            </a:extLst>
+          </p:cNvPr>
+          <p:cNvSpPr txBox="1"/>
+          <p:nvPr/>
+        </p:nvSpPr>
+        <p:spPr>
+          <a:xfrm>
+            <a:off x="10845322" y="6349262"/>
+            <a:ext cx="725968" cy="369332"/>
+          </a:xfrm>
+          <a:prstGeom prst="rect">
+            <a:avLst/>
+          </a:prstGeom>
+          <a:noFill/>
+        </p:spPr>
+        <p:txBody>
+          <a:bodyPr wrap="none" rtlCol="0">
+            <a:spAutoFit/>
+          </a:bodyPr>
+          <a:lstStyle/>
+          <a:p>
+            <a:r>
+              <a:rPr lang="en-US" dirty="0"/>
+              <a:t>Client</a:t>
+            </a:r>
+          </a:p>
+        </p:txBody>
+      </p:sp>
     </p:spTree>
     <p:extLst>
       <p:ext uri="{BB962C8B-B14F-4D97-AF65-F5344CB8AC3E}">

</xml_diff>